<commit_message>
made final tweaks to updated files
</commit_message>
<xml_diff>
--- a/FiniteDifferenceMethod.pptx
+++ b/FiniteDifferenceMethod.pptx
@@ -42,7 +42,7 @@
         <a:uFillTx/>
       </a:defRPr>
     </a:defPPr>
-    <a:lvl1pPr marL="0" marR="0" indent="0" algn="ctr" defTabSz="2438338" rtl="0" fontAlgn="auto" latinLnBrk="0" hangingPunct="0">
+    <a:lvl1pPr marL="0" marR="0" indent="0" algn="ctr" defTabSz="2438337" rtl="0" fontAlgn="auto" latinLnBrk="0" hangingPunct="0">
       <a:lnSpc>
         <a:spcPct val="100000"/>
       </a:lnSpc>
@@ -72,7 +72,7 @@
         <a:sym typeface="Helvetica Neue"/>
       </a:defRPr>
     </a:lvl1pPr>
-    <a:lvl2pPr marL="0" marR="0" indent="457200" algn="ctr" defTabSz="2438338" rtl="0" fontAlgn="auto" latinLnBrk="0" hangingPunct="0">
+    <a:lvl2pPr marL="0" marR="0" indent="0" algn="ctr" defTabSz="2438337" rtl="0" fontAlgn="auto" latinLnBrk="0" hangingPunct="0">
       <a:lnSpc>
         <a:spcPct val="100000"/>
       </a:lnSpc>
@@ -102,7 +102,7 @@
         <a:sym typeface="Helvetica Neue"/>
       </a:defRPr>
     </a:lvl2pPr>
-    <a:lvl3pPr marL="0" marR="0" indent="914400" algn="ctr" defTabSz="2438338" rtl="0" fontAlgn="auto" latinLnBrk="0" hangingPunct="0">
+    <a:lvl3pPr marL="0" marR="0" indent="0" algn="ctr" defTabSz="2438337" rtl="0" fontAlgn="auto" latinLnBrk="0" hangingPunct="0">
       <a:lnSpc>
         <a:spcPct val="100000"/>
       </a:lnSpc>
@@ -132,7 +132,7 @@
         <a:sym typeface="Helvetica Neue"/>
       </a:defRPr>
     </a:lvl3pPr>
-    <a:lvl4pPr marL="0" marR="0" indent="1371600" algn="ctr" defTabSz="2438338" rtl="0" fontAlgn="auto" latinLnBrk="0" hangingPunct="0">
+    <a:lvl4pPr marL="0" marR="0" indent="0" algn="ctr" defTabSz="2438337" rtl="0" fontAlgn="auto" latinLnBrk="0" hangingPunct="0">
       <a:lnSpc>
         <a:spcPct val="100000"/>
       </a:lnSpc>
@@ -162,7 +162,7 @@
         <a:sym typeface="Helvetica Neue"/>
       </a:defRPr>
     </a:lvl4pPr>
-    <a:lvl5pPr marL="0" marR="0" indent="1828800" algn="ctr" defTabSz="2438338" rtl="0" fontAlgn="auto" latinLnBrk="0" hangingPunct="0">
+    <a:lvl5pPr marL="0" marR="0" indent="0" algn="ctr" defTabSz="2438337" rtl="0" fontAlgn="auto" latinLnBrk="0" hangingPunct="0">
       <a:lnSpc>
         <a:spcPct val="100000"/>
       </a:lnSpc>
@@ -192,7 +192,7 @@
         <a:sym typeface="Helvetica Neue"/>
       </a:defRPr>
     </a:lvl5pPr>
-    <a:lvl6pPr marL="0" marR="0" indent="2286000" algn="ctr" defTabSz="2438338" rtl="0" fontAlgn="auto" latinLnBrk="0" hangingPunct="0">
+    <a:lvl6pPr marL="0" marR="0" indent="0" algn="ctr" defTabSz="2438337" rtl="0" fontAlgn="auto" latinLnBrk="0" hangingPunct="0">
       <a:lnSpc>
         <a:spcPct val="100000"/>
       </a:lnSpc>
@@ -222,7 +222,7 @@
         <a:sym typeface="Helvetica Neue"/>
       </a:defRPr>
     </a:lvl6pPr>
-    <a:lvl7pPr marL="0" marR="0" indent="2743200" algn="ctr" defTabSz="2438338" rtl="0" fontAlgn="auto" latinLnBrk="0" hangingPunct="0">
+    <a:lvl7pPr marL="0" marR="0" indent="0" algn="ctr" defTabSz="2438337" rtl="0" fontAlgn="auto" latinLnBrk="0" hangingPunct="0">
       <a:lnSpc>
         <a:spcPct val="100000"/>
       </a:lnSpc>
@@ -252,7 +252,7 @@
         <a:sym typeface="Helvetica Neue"/>
       </a:defRPr>
     </a:lvl7pPr>
-    <a:lvl8pPr marL="0" marR="0" indent="3200400" algn="ctr" defTabSz="2438338" rtl="0" fontAlgn="auto" latinLnBrk="0" hangingPunct="0">
+    <a:lvl8pPr marL="0" marR="0" indent="0" algn="ctr" defTabSz="2438337" rtl="0" fontAlgn="auto" latinLnBrk="0" hangingPunct="0">
       <a:lnSpc>
         <a:spcPct val="100000"/>
       </a:lnSpc>
@@ -282,7 +282,7 @@
         <a:sym typeface="Helvetica Neue"/>
       </a:defRPr>
     </a:lvl8pPr>
-    <a:lvl9pPr marL="0" marR="0" indent="3657600" algn="ctr" defTabSz="2438338" rtl="0" fontAlgn="auto" latinLnBrk="0" hangingPunct="0">
+    <a:lvl9pPr marL="0" marR="0" indent="0" algn="ctr" defTabSz="2438337" rtl="0" fontAlgn="auto" latinLnBrk="0" hangingPunct="0">
       <a:lnSpc>
         <a:spcPct val="100000"/>
       </a:lnSpc>
@@ -495,7 +495,7 @@
 </file>
 
 <file path=ppt/slideLayouts/slideLayout1.xml><?xml version="1.0" encoding="utf-8"?>
-<p:sldLayout xmlns:a="http://schemas.openxmlformats.org/drawingml/2006/main" xmlns:r="http://schemas.openxmlformats.org/officeDocument/2006/relationships" xmlns:p="http://schemas.openxmlformats.org/presentationml/2006/main" xmlns:m="http://schemas.openxmlformats.org/officeDocument/2006/math" xmlns:a14="http://schemas.microsoft.com/office/drawing/2010/main" type="title" showMasterSp="1" showMasterPhAnim="1">
+<p:sldLayout xmlns:a="http://schemas.openxmlformats.org/drawingml/2006/main" xmlns:r="http://schemas.openxmlformats.org/officeDocument/2006/relationships" xmlns:p="http://schemas.openxmlformats.org/presentationml/2006/main" xmlns:m="http://schemas.openxmlformats.org/officeDocument/2006/math" xmlns:a14="http://schemas.microsoft.com/office/drawing/2010/main" type="tx" showMasterSp="1" showMasterPhAnim="1">
   <p:cSld name="Title">
     <p:spTree>
       <p:nvGrpSpPr>
@@ -513,23 +513,23 @@
       </p:grpSpPr>
       <p:sp>
         <p:nvSpPr>
-          <p:cNvPr id="11" name="Author and Date"/>
+          <p:cNvPr id="11" name="Body Level One…"/>
           <p:cNvSpPr txBox="1"/>
           <p:nvPr>
-            <p:ph type="body" sz="quarter" idx="21" hasCustomPrompt="1"/>
+            <p:ph type="body" sz="quarter" idx="1" hasCustomPrompt="1"/>
           </p:nvPr>
         </p:nvSpPr>
         <p:spPr>
           <a:xfrm>
             <a:off x="1201340" y="11859862"/>
-            <a:ext cx="21971003" cy="636979"/>
+            <a:ext cx="21971004" cy="636980"/>
           </a:xfrm>
           <a:prstGeom prst="rect">
             <a:avLst/>
           </a:prstGeom>
         </p:spPr>
         <p:txBody>
-          <a:bodyPr lIns="45719" tIns="45719" rIns="45719" bIns="45719"/>
+          <a:bodyPr lIns="45718" tIns="45718" rIns="45718" bIns="45718" numCol="1" spcCol="38100"/>
           <a:lstStyle>
             <a:lvl1pPr marL="0" indent="0" defTabSz="825500">
               <a:lnSpc>
@@ -542,11 +542,71 @@
               <a:buNone/>
               <a:defRPr b="1" sz="3600"/>
             </a:lvl1pPr>
+            <a:lvl2pPr marL="1066800" indent="-457200" defTabSz="825500">
+              <a:lnSpc>
+                <a:spcPct val="100000"/>
+              </a:lnSpc>
+              <a:spcBef>
+                <a:spcPts val="0"/>
+              </a:spcBef>
+              <a:defRPr b="1" sz="3600"/>
+            </a:lvl2pPr>
+            <a:lvl3pPr marL="1676400" indent="-457200" defTabSz="825500">
+              <a:lnSpc>
+                <a:spcPct val="100000"/>
+              </a:lnSpc>
+              <a:spcBef>
+                <a:spcPts val="0"/>
+              </a:spcBef>
+              <a:defRPr b="1" sz="3600"/>
+            </a:lvl3pPr>
+            <a:lvl4pPr marL="2286000" indent="-457200" defTabSz="825500">
+              <a:lnSpc>
+                <a:spcPct val="100000"/>
+              </a:lnSpc>
+              <a:spcBef>
+                <a:spcPts val="0"/>
+              </a:spcBef>
+              <a:defRPr b="1" sz="3600"/>
+            </a:lvl4pPr>
+            <a:lvl5pPr marL="2895600" indent="-457200" defTabSz="825500">
+              <a:lnSpc>
+                <a:spcPct val="100000"/>
+              </a:lnSpc>
+              <a:spcBef>
+                <a:spcPts val="0"/>
+              </a:spcBef>
+              <a:defRPr b="1" sz="3600"/>
+            </a:lvl5pPr>
           </a:lstStyle>
           <a:p>
             <a:pPr/>
             <a:r>
               <a:t>Author and Date</a:t>
+            </a:r>
+          </a:p>
+          <a:p>
+            <a:pPr lvl="1"/>
+            <a:r>
+              <a:t/>
+            </a:r>
+          </a:p>
+          <a:p>
+            <a:pPr lvl="2"/>
+            <a:r>
+              <a:t/>
+            </a:r>
+          </a:p>
+          <a:p>
+            <a:pPr lvl="3"/>
+            <a:r>
+              <a:t/>
+            </a:r>
+          </a:p>
+          <a:p>
+            <a:pPr lvl="4"/>
+            <a:r>
+              <a:t/>
             </a:r>
           </a:p>
         </p:txBody>
@@ -562,7 +622,7 @@
         <p:spPr>
           <a:xfrm>
             <a:off x="1206496" y="2574991"/>
-            <a:ext cx="21971004" cy="4648201"/>
+            <a:ext cx="21971005" cy="4648202"/>
           </a:xfrm>
           <a:prstGeom prst="rect">
             <a:avLst/>
@@ -588,20 +648,20 @@
           <p:cNvPr id="13" name="Body Level One…"/>
           <p:cNvSpPr txBox="1"/>
           <p:nvPr>
-            <p:ph type="body" sz="quarter" idx="1" hasCustomPrompt="1"/>
+            <p:ph type="body" sz="quarter" idx="21" hasCustomPrompt="1"/>
           </p:nvPr>
         </p:nvSpPr>
         <p:spPr>
           <a:xfrm>
             <a:off x="1201342" y="7223190"/>
-            <a:ext cx="21971001" cy="1905001"/>
+            <a:ext cx="21971002" cy="1905002"/>
           </a:xfrm>
           <a:prstGeom prst="rect">
             <a:avLst/>
           </a:prstGeom>
         </p:spPr>
         <p:txBody>
-          <a:bodyPr/>
+          <a:bodyPr numCol="1" spcCol="38100"/>
           <a:lstStyle>
             <a:lvl1pPr marL="0" indent="0" defTabSz="825500">
               <a:lnSpc>
@@ -614,79 +674,11 @@
               <a:buNone/>
               <a:defRPr b="1" sz="5500"/>
             </a:lvl1pPr>
-            <a:lvl2pPr marL="0" indent="457200" defTabSz="825500">
-              <a:lnSpc>
-                <a:spcPct val="100000"/>
-              </a:lnSpc>
-              <a:spcBef>
-                <a:spcPts val="0"/>
-              </a:spcBef>
-              <a:buSzTx/>
-              <a:buNone/>
-              <a:defRPr b="1" sz="5500"/>
-            </a:lvl2pPr>
-            <a:lvl3pPr marL="0" indent="914400" defTabSz="825500">
-              <a:lnSpc>
-                <a:spcPct val="100000"/>
-              </a:lnSpc>
-              <a:spcBef>
-                <a:spcPts val="0"/>
-              </a:spcBef>
-              <a:buSzTx/>
-              <a:buNone/>
-              <a:defRPr b="1" sz="5500"/>
-            </a:lvl3pPr>
-            <a:lvl4pPr marL="0" indent="1371600" defTabSz="825500">
-              <a:lnSpc>
-                <a:spcPct val="100000"/>
-              </a:lnSpc>
-              <a:spcBef>
-                <a:spcPts val="0"/>
-              </a:spcBef>
-              <a:buSzTx/>
-              <a:buNone/>
-              <a:defRPr b="1" sz="5500"/>
-            </a:lvl4pPr>
-            <a:lvl5pPr marL="0" indent="1828800" defTabSz="825500">
-              <a:lnSpc>
-                <a:spcPct val="100000"/>
-              </a:lnSpc>
-              <a:spcBef>
-                <a:spcPts val="0"/>
-              </a:spcBef>
-              <a:buSzTx/>
-              <a:buNone/>
-              <a:defRPr b="1" sz="5500"/>
-            </a:lvl5pPr>
           </a:lstStyle>
           <a:p>
             <a:pPr/>
             <a:r>
               <a:t>Presentation Subtitle</a:t>
-            </a:r>
-          </a:p>
-          <a:p>
-            <a:pPr lvl="1"/>
-            <a:r>
-              <a:t/>
-            </a:r>
-          </a:p>
-          <a:p>
-            <a:pPr lvl="2"/>
-            <a:r>
-              <a:t/>
-            </a:r>
-          </a:p>
-          <a:p>
-            <a:pPr lvl="3"/>
-            <a:r>
-              <a:t/>
-            </a:r>
-          </a:p>
-          <a:p>
-            <a:pPr lvl="4"/>
-            <a:r>
-              <a:t/>
             </a:r>
           </a:p>
         </p:txBody>
@@ -757,7 +749,7 @@
           </a:prstGeom>
         </p:spPr>
         <p:txBody>
-          <a:bodyPr anchor="ctr"/>
+          <a:bodyPr numCol="1" spcCol="38100" anchor="ctr"/>
           <a:lstStyle>
             <a:lvl1pPr marL="0" indent="0" algn="ctr">
               <a:lnSpc>
@@ -775,7 +767,7 @@
                 <a:sym typeface="Helvetica Neue Medium"/>
               </a:defRPr>
             </a:lvl1pPr>
-            <a:lvl2pPr marL="0" indent="457200" algn="ctr">
+            <a:lvl2pPr marL="0" indent="0" algn="ctr">
               <a:lnSpc>
                 <a:spcPct val="80000"/>
               </a:lnSpc>
@@ -791,7 +783,7 @@
                 <a:sym typeface="Helvetica Neue Medium"/>
               </a:defRPr>
             </a:lvl2pPr>
-            <a:lvl3pPr marL="0" indent="914400" algn="ctr">
+            <a:lvl3pPr marL="0" indent="0" algn="ctr">
               <a:lnSpc>
                 <a:spcPct val="80000"/>
               </a:lnSpc>
@@ -807,7 +799,7 @@
                 <a:sym typeface="Helvetica Neue Medium"/>
               </a:defRPr>
             </a:lvl3pPr>
-            <a:lvl4pPr marL="0" indent="1371600" algn="ctr">
+            <a:lvl4pPr marL="0" indent="0" algn="ctr">
               <a:lnSpc>
                 <a:spcPct val="80000"/>
               </a:lnSpc>
@@ -823,7 +815,7 @@
                 <a:sym typeface="Helvetica Neue Medium"/>
               </a:defRPr>
             </a:lvl4pPr>
-            <a:lvl5pPr marL="0" indent="1828800" algn="ctr">
+            <a:lvl5pPr marL="0" indent="0" algn="ctr">
               <a:lnSpc>
                 <a:spcPct val="80000"/>
               </a:lnSpc>
@@ -930,15 +922,15 @@
         </p:nvSpPr>
         <p:spPr>
           <a:xfrm>
-            <a:off x="1206500" y="1075927"/>
-            <a:ext cx="21971000" cy="7241584"/>
+            <a:off x="1206500" y="1075926"/>
+            <a:ext cx="21971000" cy="7241586"/>
           </a:xfrm>
           <a:prstGeom prst="rect">
             <a:avLst/>
           </a:prstGeom>
         </p:spPr>
         <p:txBody>
-          <a:bodyPr anchor="b"/>
+          <a:bodyPr numCol="1" spcCol="38100" anchor="b"/>
           <a:lstStyle>
             <a:lvl1pPr marL="0" indent="0" algn="ctr">
               <a:lnSpc>
@@ -951,7 +943,7 @@
               <a:buNone/>
               <a:defRPr b="1" spc="-250" sz="25000"/>
             </a:lvl1pPr>
-            <a:lvl2pPr marL="0" indent="457200" algn="ctr">
+            <a:lvl2pPr marL="0" indent="0" algn="ctr">
               <a:lnSpc>
                 <a:spcPct val="80000"/>
               </a:lnSpc>
@@ -962,7 +954,7 @@
               <a:buNone/>
               <a:defRPr b="1" spc="-250" sz="25000"/>
             </a:lvl2pPr>
-            <a:lvl3pPr marL="0" indent="914400" algn="ctr">
+            <a:lvl3pPr marL="0" indent="0" algn="ctr">
               <a:lnSpc>
                 <a:spcPct val="80000"/>
               </a:lnSpc>
@@ -973,7 +965,7 @@
               <a:buNone/>
               <a:defRPr b="1" spc="-250" sz="25000"/>
             </a:lvl3pPr>
-            <a:lvl4pPr marL="0" indent="1371600" algn="ctr">
+            <a:lvl4pPr marL="0" indent="0" algn="ctr">
               <a:lnSpc>
                 <a:spcPct val="80000"/>
               </a:lnSpc>
@@ -984,7 +976,7 @@
               <a:buNone/>
               <a:defRPr b="1" spc="-250" sz="25000"/>
             </a:lvl4pPr>
-            <a:lvl5pPr marL="0" indent="1828800" algn="ctr">
+            <a:lvl5pPr marL="0" indent="0" algn="ctr">
               <a:lnSpc>
                 <a:spcPct val="80000"/>
               </a:lnSpc>
@@ -1046,7 +1038,7 @@
           </a:prstGeom>
         </p:spPr>
         <p:txBody>
-          <a:bodyPr lIns="45719" tIns="45719" rIns="45719" bIns="45719"/>
+          <a:bodyPr lIns="45718" tIns="45718" rIns="45718" bIns="45718" numCol="1" spcCol="38100"/>
           <a:lstStyle>
             <a:lvl1pPr marL="0" indent="0" algn="ctr" defTabSz="825500">
               <a:lnSpc>
@@ -1118,23 +1110,23 @@
       </p:grpSpPr>
       <p:sp>
         <p:nvSpPr>
-          <p:cNvPr id="115" name="Attribution"/>
+          <p:cNvPr id="115" name="Body Level One…"/>
           <p:cNvSpPr txBox="1"/>
           <p:nvPr>
-            <p:ph type="body" sz="quarter" idx="21" hasCustomPrompt="1"/>
+            <p:ph type="body" sz="quarter" idx="1" hasCustomPrompt="1"/>
           </p:nvPr>
         </p:nvSpPr>
         <p:spPr>
           <a:xfrm>
-            <a:off x="2430025" y="10675453"/>
-            <a:ext cx="20200052" cy="636979"/>
+            <a:off x="2430024" y="10675453"/>
+            <a:ext cx="20200054" cy="636980"/>
           </a:xfrm>
           <a:prstGeom prst="rect">
             <a:avLst/>
           </a:prstGeom>
         </p:spPr>
         <p:txBody>
-          <a:bodyPr lIns="45719" tIns="45719" rIns="45719" bIns="45719"/>
+          <a:bodyPr lIns="45718" tIns="45718" rIns="45718" bIns="45718" numCol="1" spcCol="38100"/>
           <a:lstStyle>
             <a:lvl1pPr marL="0" indent="0" defTabSz="825500">
               <a:lnSpc>
@@ -1147,11 +1139,71 @@
               <a:buNone/>
               <a:defRPr b="1" sz="3600"/>
             </a:lvl1pPr>
+            <a:lvl2pPr marL="1066800" indent="-457200" defTabSz="825500">
+              <a:lnSpc>
+                <a:spcPct val="100000"/>
+              </a:lnSpc>
+              <a:spcBef>
+                <a:spcPts val="0"/>
+              </a:spcBef>
+              <a:defRPr b="1" sz="3600"/>
+            </a:lvl2pPr>
+            <a:lvl3pPr marL="1676400" indent="-457200" defTabSz="825500">
+              <a:lnSpc>
+                <a:spcPct val="100000"/>
+              </a:lnSpc>
+              <a:spcBef>
+                <a:spcPts val="0"/>
+              </a:spcBef>
+              <a:defRPr b="1" sz="3600"/>
+            </a:lvl3pPr>
+            <a:lvl4pPr marL="2286000" indent="-457200" defTabSz="825500">
+              <a:lnSpc>
+                <a:spcPct val="100000"/>
+              </a:lnSpc>
+              <a:spcBef>
+                <a:spcPts val="0"/>
+              </a:spcBef>
+              <a:defRPr b="1" sz="3600"/>
+            </a:lvl4pPr>
+            <a:lvl5pPr marL="2895600" indent="-457200" defTabSz="825500">
+              <a:lnSpc>
+                <a:spcPct val="100000"/>
+              </a:lnSpc>
+              <a:spcBef>
+                <a:spcPts val="0"/>
+              </a:spcBef>
+              <a:defRPr b="1" sz="3600"/>
+            </a:lvl5pPr>
           </a:lstStyle>
           <a:p>
             <a:pPr/>
             <a:r>
               <a:t>Attribution</a:t>
+            </a:r>
+          </a:p>
+          <a:p>
+            <a:pPr lvl="1"/>
+            <a:r>
+              <a:t/>
+            </a:r>
+          </a:p>
+          <a:p>
+            <a:pPr lvl="2"/>
+            <a:r>
+              <a:t/>
+            </a:r>
+          </a:p>
+          <a:p>
+            <a:pPr lvl="3"/>
+            <a:r>
+              <a:t/>
+            </a:r>
+          </a:p>
+          <a:p>
+            <a:pPr lvl="4"/>
+            <a:r>
+              <a:t/>
             </a:r>
           </a:p>
         </p:txBody>
@@ -1161,115 +1213,39 @@
           <p:cNvPr id="116" name="Body Level One…"/>
           <p:cNvSpPr txBox="1"/>
           <p:nvPr>
-            <p:ph type="body" sz="half" idx="1" hasCustomPrompt="1"/>
+            <p:ph type="body" sz="half" idx="21" hasCustomPrompt="1"/>
           </p:nvPr>
         </p:nvSpPr>
         <p:spPr>
           <a:xfrm>
             <a:off x="1753923" y="4939860"/>
-            <a:ext cx="20876154" cy="3836280"/>
+            <a:ext cx="20876154" cy="3836281"/>
           </a:xfrm>
           <a:prstGeom prst="rect">
             <a:avLst/>
           </a:prstGeom>
         </p:spPr>
         <p:txBody>
-          <a:bodyPr/>
+          <a:bodyPr numCol="1" spcCol="38100"/>
           <a:lstStyle>
-            <a:lvl1pPr marL="638923" indent="-469900">
+            <a:lvl1pPr marL="469900" indent="-300876">
               <a:spcBef>
                 <a:spcPts val="0"/>
               </a:spcBef>
               <a:buSzTx/>
               <a:buNone/>
-              <a:defRPr spc="-170" sz="8500">
+              <a:defRPr spc="-200" sz="8500">
                 <a:latin typeface="Helvetica Neue Medium"/>
                 <a:ea typeface="Helvetica Neue Medium"/>
                 <a:cs typeface="Helvetica Neue Medium"/>
                 <a:sym typeface="Helvetica Neue Medium"/>
               </a:defRPr>
             </a:lvl1pPr>
-            <a:lvl2pPr marL="638923" indent="-12700">
-              <a:spcBef>
-                <a:spcPts val="0"/>
-              </a:spcBef>
-              <a:buSzTx/>
-              <a:buNone/>
-              <a:defRPr spc="-170" sz="8500">
-                <a:latin typeface="Helvetica Neue Medium"/>
-                <a:ea typeface="Helvetica Neue Medium"/>
-                <a:cs typeface="Helvetica Neue Medium"/>
-                <a:sym typeface="Helvetica Neue Medium"/>
-              </a:defRPr>
-            </a:lvl2pPr>
-            <a:lvl3pPr marL="638923" indent="444500">
-              <a:spcBef>
-                <a:spcPts val="0"/>
-              </a:spcBef>
-              <a:buSzTx/>
-              <a:buNone/>
-              <a:defRPr spc="-170" sz="8500">
-                <a:latin typeface="Helvetica Neue Medium"/>
-                <a:ea typeface="Helvetica Neue Medium"/>
-                <a:cs typeface="Helvetica Neue Medium"/>
-                <a:sym typeface="Helvetica Neue Medium"/>
-              </a:defRPr>
-            </a:lvl3pPr>
-            <a:lvl4pPr marL="638923" indent="901700">
-              <a:spcBef>
-                <a:spcPts val="0"/>
-              </a:spcBef>
-              <a:buSzTx/>
-              <a:buNone/>
-              <a:defRPr spc="-170" sz="8500">
-                <a:latin typeface="Helvetica Neue Medium"/>
-                <a:ea typeface="Helvetica Neue Medium"/>
-                <a:cs typeface="Helvetica Neue Medium"/>
-                <a:sym typeface="Helvetica Neue Medium"/>
-              </a:defRPr>
-            </a:lvl4pPr>
-            <a:lvl5pPr marL="638923" indent="1358900">
-              <a:spcBef>
-                <a:spcPts val="0"/>
-              </a:spcBef>
-              <a:buSzTx/>
-              <a:buNone/>
-              <a:defRPr spc="-170" sz="8500">
-                <a:latin typeface="Helvetica Neue Medium"/>
-                <a:ea typeface="Helvetica Neue Medium"/>
-                <a:cs typeface="Helvetica Neue Medium"/>
-                <a:sym typeface="Helvetica Neue Medium"/>
-              </a:defRPr>
-            </a:lvl5pPr>
           </a:lstStyle>
           <a:p>
             <a:pPr/>
             <a:r>
               <a:t>“Notable Quote”</a:t>
-            </a:r>
-          </a:p>
-          <a:p>
-            <a:pPr lvl="1"/>
-            <a:r>
-              <a:t/>
-            </a:r>
-          </a:p>
-          <a:p>
-            <a:pPr lvl="2"/>
-            <a:r>
-              <a:t/>
-            </a:r>
-          </a:p>
-          <a:p>
-            <a:pPr lvl="3"/>
-            <a:r>
-              <a:t/>
-            </a:r>
-          </a:p>
-          <a:p>
-            <a:pPr lvl="4"/>
-            <a:r>
-              <a:t/>
             </a:r>
           </a:p>
         </p:txBody>
@@ -1340,7 +1316,7 @@
           </a:prstGeom>
         </p:spPr>
         <p:txBody>
-          <a:bodyPr lIns="91439" tIns="45719" rIns="91439" bIns="45719">
+          <a:bodyPr lIns="91439" tIns="45719" rIns="91439" bIns="45719" numCol="1" spcCol="38100">
             <a:noAutofit/>
           </a:bodyPr>
           <a:lstStyle/>
@@ -1367,7 +1343,7 @@
           </a:prstGeom>
         </p:spPr>
         <p:txBody>
-          <a:bodyPr lIns="91439" tIns="45719" rIns="91439" bIns="45719">
+          <a:bodyPr lIns="91439" tIns="45719" rIns="91439" bIns="45719" numCol="1" spcCol="38100">
             <a:noAutofit/>
           </a:bodyPr>
           <a:lstStyle/>
@@ -1394,7 +1370,7 @@
           </a:prstGeom>
         </p:spPr>
         <p:txBody>
-          <a:bodyPr lIns="91439" tIns="45719" rIns="91439" bIns="45719">
+          <a:bodyPr lIns="91439" tIns="45719" rIns="91439" bIns="45719" numCol="1" spcCol="38100">
             <a:noAutofit/>
           </a:bodyPr>
           <a:lstStyle/>
@@ -1469,7 +1445,7 @@
           </a:prstGeom>
         </p:spPr>
         <p:txBody>
-          <a:bodyPr lIns="91439" tIns="45719" rIns="91439" bIns="45719">
+          <a:bodyPr lIns="91439" tIns="45719" rIns="91439" bIns="45719" numCol="1" spcCol="38100">
             <a:noAutofit/>
           </a:bodyPr>
           <a:lstStyle/>
@@ -1600,7 +1576,7 @@
           </a:prstGeom>
         </p:spPr>
         <p:txBody>
-          <a:bodyPr lIns="91439" tIns="45719" rIns="91439" bIns="45719">
+          <a:bodyPr lIns="91439" tIns="45719" rIns="91439" bIns="45719" numCol="1" spcCol="38100">
             <a:noAutofit/>
           </a:bodyPr>
           <a:lstStyle/>
@@ -1643,23 +1619,23 @@
       </p:sp>
       <p:sp>
         <p:nvSpPr>
-          <p:cNvPr id="23" name="Author and Date"/>
+          <p:cNvPr id="23" name="Body Level One…"/>
           <p:cNvSpPr txBox="1"/>
           <p:nvPr>
-            <p:ph type="body" sz="quarter" idx="22" hasCustomPrompt="1"/>
+            <p:ph type="body" sz="quarter" idx="1" hasCustomPrompt="1"/>
           </p:nvPr>
         </p:nvSpPr>
         <p:spPr>
           <a:xfrm>
             <a:off x="1207690" y="1106137"/>
-            <a:ext cx="21968621" cy="636979"/>
+            <a:ext cx="21968621" cy="636980"/>
           </a:xfrm>
           <a:prstGeom prst="rect">
             <a:avLst/>
           </a:prstGeom>
         </p:spPr>
         <p:txBody>
-          <a:bodyPr lIns="45719" tIns="45719" rIns="45719" bIns="45719"/>
+          <a:bodyPr lIns="45718" tIns="45718" rIns="45718" bIns="45718" numCol="1" spcCol="38100"/>
           <a:lstStyle>
             <a:lvl1pPr marL="0" indent="0" defTabSz="825500">
               <a:lnSpc>
@@ -1672,11 +1648,71 @@
               <a:buNone/>
               <a:defRPr b="1" sz="3600"/>
             </a:lvl1pPr>
+            <a:lvl2pPr marL="1066800" indent="-457200" defTabSz="825500">
+              <a:lnSpc>
+                <a:spcPct val="100000"/>
+              </a:lnSpc>
+              <a:spcBef>
+                <a:spcPts val="0"/>
+              </a:spcBef>
+              <a:defRPr b="1" sz="3600"/>
+            </a:lvl2pPr>
+            <a:lvl3pPr marL="1676400" indent="-457200" defTabSz="825500">
+              <a:lnSpc>
+                <a:spcPct val="100000"/>
+              </a:lnSpc>
+              <a:spcBef>
+                <a:spcPts val="0"/>
+              </a:spcBef>
+              <a:defRPr b="1" sz="3600"/>
+            </a:lvl3pPr>
+            <a:lvl4pPr marL="2286000" indent="-457200" defTabSz="825500">
+              <a:lnSpc>
+                <a:spcPct val="100000"/>
+              </a:lnSpc>
+              <a:spcBef>
+                <a:spcPts val="0"/>
+              </a:spcBef>
+              <a:defRPr b="1" sz="3600"/>
+            </a:lvl4pPr>
+            <a:lvl5pPr marL="2895600" indent="-457200" defTabSz="825500">
+              <a:lnSpc>
+                <a:spcPct val="100000"/>
+              </a:lnSpc>
+              <a:spcBef>
+                <a:spcPts val="0"/>
+              </a:spcBef>
+              <a:defRPr b="1" sz="3600"/>
+            </a:lvl5pPr>
           </a:lstStyle>
           <a:p>
             <a:pPr/>
             <a:r>
               <a:t>Author and Date</a:t>
+            </a:r>
+          </a:p>
+          <a:p>
+            <a:pPr lvl="1"/>
+            <a:r>
+              <a:t/>
+            </a:r>
+          </a:p>
+          <a:p>
+            <a:pPr lvl="2"/>
+            <a:r>
+              <a:t/>
+            </a:r>
+          </a:p>
+          <a:p>
+            <a:pPr lvl="3"/>
+            <a:r>
+              <a:t/>
+            </a:r>
+          </a:p>
+          <a:p>
+            <a:pPr lvl="4"/>
+            <a:r>
+              <a:t/>
             </a:r>
           </a:p>
         </p:txBody>
@@ -1686,20 +1722,20 @@
           <p:cNvPr id="24" name="Body Level One…"/>
           <p:cNvSpPr txBox="1"/>
           <p:nvPr>
-            <p:ph type="body" sz="quarter" idx="1" hasCustomPrompt="1"/>
+            <p:ph type="body" sz="quarter" idx="22" hasCustomPrompt="1"/>
           </p:nvPr>
         </p:nvSpPr>
         <p:spPr>
           <a:xfrm>
-            <a:off x="1206500" y="11609910"/>
-            <a:ext cx="21971000" cy="1116952"/>
+            <a:off x="1206500" y="11609909"/>
+            <a:ext cx="21971000" cy="1116953"/>
           </a:xfrm>
           <a:prstGeom prst="rect">
             <a:avLst/>
           </a:prstGeom>
         </p:spPr>
         <p:txBody>
-          <a:bodyPr/>
+          <a:bodyPr numCol="1" spcCol="38100"/>
           <a:lstStyle>
             <a:lvl1pPr marL="0" indent="0" defTabSz="825500">
               <a:lnSpc>
@@ -1712,79 +1748,11 @@
               <a:buNone/>
               <a:defRPr b="1" sz="5500"/>
             </a:lvl1pPr>
-            <a:lvl2pPr marL="0" indent="457200" defTabSz="825500">
-              <a:lnSpc>
-                <a:spcPct val="100000"/>
-              </a:lnSpc>
-              <a:spcBef>
-                <a:spcPts val="0"/>
-              </a:spcBef>
-              <a:buSzTx/>
-              <a:buNone/>
-              <a:defRPr b="1" sz="5500"/>
-            </a:lvl2pPr>
-            <a:lvl3pPr marL="0" indent="914400" defTabSz="825500">
-              <a:lnSpc>
-                <a:spcPct val="100000"/>
-              </a:lnSpc>
-              <a:spcBef>
-                <a:spcPts val="0"/>
-              </a:spcBef>
-              <a:buSzTx/>
-              <a:buNone/>
-              <a:defRPr b="1" sz="5500"/>
-            </a:lvl3pPr>
-            <a:lvl4pPr marL="0" indent="1371600" defTabSz="825500">
-              <a:lnSpc>
-                <a:spcPct val="100000"/>
-              </a:lnSpc>
-              <a:spcBef>
-                <a:spcPts val="0"/>
-              </a:spcBef>
-              <a:buSzTx/>
-              <a:buNone/>
-              <a:defRPr b="1" sz="5500"/>
-            </a:lvl4pPr>
-            <a:lvl5pPr marL="0" indent="1828800" defTabSz="825500">
-              <a:lnSpc>
-                <a:spcPct val="100000"/>
-              </a:lnSpc>
-              <a:spcBef>
-                <a:spcPts val="0"/>
-              </a:spcBef>
-              <a:buSzTx/>
-              <a:buNone/>
-              <a:defRPr b="1" sz="5500"/>
-            </a:lvl5pPr>
           </a:lstStyle>
           <a:p>
             <a:pPr/>
             <a:r>
               <a:t>Presentation Subtitle</a:t>
-            </a:r>
-          </a:p>
-          <a:p>
-            <a:pPr lvl="1"/>
-            <a:r>
-              <a:t/>
-            </a:r>
-          </a:p>
-          <a:p>
-            <a:pPr lvl="2"/>
-            <a:r>
-              <a:t/>
-            </a:r>
-          </a:p>
-          <a:p>
-            <a:pPr lvl="3"/>
-            <a:r>
-              <a:t/>
-            </a:r>
-          </a:p>
-          <a:p>
-            <a:pPr lvl="4"/>
-            <a:r>
-              <a:t/>
             </a:r>
           </a:p>
         </p:txBody>
@@ -1855,7 +1823,7 @@
           </a:prstGeom>
         </p:spPr>
         <p:txBody>
-          <a:bodyPr lIns="91439" tIns="45719" rIns="91439" bIns="45719">
+          <a:bodyPr lIns="91439" tIns="45719" rIns="91439" bIns="45719" numCol="1" spcCol="38100">
             <a:noAutofit/>
           </a:bodyPr>
           <a:lstStyle/>
@@ -1875,7 +1843,7 @@
         <p:spPr>
           <a:xfrm>
             <a:off x="1206500" y="1270000"/>
-            <a:ext cx="9779000" cy="5882273"/>
+            <a:ext cx="9779000" cy="5882274"/>
           </a:xfrm>
           <a:prstGeom prst="rect">
             <a:avLst/>
@@ -1910,7 +1878,7 @@
           </a:prstGeom>
         </p:spPr>
         <p:txBody>
-          <a:bodyPr/>
+          <a:bodyPr numCol="1" spcCol="38100"/>
           <a:lstStyle>
             <a:lvl1pPr marL="0" indent="0" defTabSz="825500">
               <a:lnSpc>
@@ -1923,7 +1891,7 @@
               <a:buNone/>
               <a:defRPr b="1" sz="5500"/>
             </a:lvl1pPr>
-            <a:lvl2pPr marL="0" indent="457200" defTabSz="825500">
+            <a:lvl2pPr marL="0" indent="0" defTabSz="825500">
               <a:lnSpc>
                 <a:spcPct val="100000"/>
               </a:lnSpc>
@@ -1934,7 +1902,7 @@
               <a:buNone/>
               <a:defRPr b="1" sz="5500"/>
             </a:lvl2pPr>
-            <a:lvl3pPr marL="0" indent="914400" defTabSz="825500">
+            <a:lvl3pPr marL="0" indent="0" defTabSz="825500">
               <a:lnSpc>
                 <a:spcPct val="100000"/>
               </a:lnSpc>
@@ -1945,7 +1913,7 @@
               <a:buNone/>
               <a:defRPr b="1" sz="5500"/>
             </a:lvl3pPr>
-            <a:lvl4pPr marL="0" indent="1371600" defTabSz="825500">
+            <a:lvl4pPr marL="0" indent="0" defTabSz="825500">
               <a:lnSpc>
                 <a:spcPct val="100000"/>
               </a:lnSpc>
@@ -1956,7 +1924,7 @@
               <a:buNone/>
               <a:defRPr b="1" sz="5500"/>
             </a:lvl4pPr>
-            <a:lvl5pPr marL="0" indent="1828800" defTabSz="825500">
+            <a:lvl5pPr marL="0" indent="0" defTabSz="825500">
               <a:lnSpc>
                 <a:spcPct val="100000"/>
               </a:lnSpc>
@@ -2010,8 +1978,8 @@
         </p:nvSpPr>
         <p:spPr>
           <a:xfrm>
-            <a:off x="12001499" y="13085233"/>
-            <a:ext cx="368505" cy="374600"/>
+            <a:off x="12001500" y="13085233"/>
+            <a:ext cx="368504" cy="374600"/>
           </a:xfrm>
           <a:prstGeom prst="rect">
             <a:avLst/>
@@ -2061,6 +2029,10 @@
           </p:nvPr>
         </p:nvSpPr>
         <p:spPr>
+          <a:xfrm>
+            <a:off x="1206500" y="1079500"/>
+            <a:ext cx="21971000" cy="1433164"/>
+          </a:xfrm>
           <a:prstGeom prst="rect">
             <a:avLst/>
           </a:prstGeom>
@@ -2078,23 +2050,23 @@
       </p:sp>
       <p:sp>
         <p:nvSpPr>
-          <p:cNvPr id="43" name="Slide Subtitle"/>
+          <p:cNvPr id="43" name="Body Level One…"/>
           <p:cNvSpPr txBox="1"/>
           <p:nvPr>
-            <p:ph type="body" sz="quarter" idx="21" hasCustomPrompt="1"/>
+            <p:ph type="body" sz="quarter" idx="1" hasCustomPrompt="1"/>
           </p:nvPr>
         </p:nvSpPr>
         <p:spPr>
           <a:xfrm>
-            <a:off x="1206500" y="2372962"/>
-            <a:ext cx="21971000" cy="934780"/>
+            <a:off x="1206500" y="2372961"/>
+            <a:ext cx="21971000" cy="934781"/>
           </a:xfrm>
           <a:prstGeom prst="rect">
             <a:avLst/>
           </a:prstGeom>
         </p:spPr>
         <p:txBody>
-          <a:bodyPr lIns="45719" tIns="45719" rIns="45719" bIns="45719"/>
+          <a:bodyPr lIns="45718" tIns="45718" rIns="45718" bIns="45718" numCol="1" spcCol="38100"/>
           <a:lstStyle>
             <a:lvl1pPr marL="0" indent="0" defTabSz="825500">
               <a:lnSpc>
@@ -2107,11 +2079,71 @@
               <a:buNone/>
               <a:defRPr b="1" sz="5500"/>
             </a:lvl1pPr>
+            <a:lvl2pPr marL="1308100" indent="-698500" defTabSz="825500">
+              <a:lnSpc>
+                <a:spcPct val="100000"/>
+              </a:lnSpc>
+              <a:spcBef>
+                <a:spcPts val="0"/>
+              </a:spcBef>
+              <a:defRPr b="1" sz="5500"/>
+            </a:lvl2pPr>
+            <a:lvl3pPr marL="1917700" indent="-698500" defTabSz="825500">
+              <a:lnSpc>
+                <a:spcPct val="100000"/>
+              </a:lnSpc>
+              <a:spcBef>
+                <a:spcPts val="0"/>
+              </a:spcBef>
+              <a:defRPr b="1" sz="5500"/>
+            </a:lvl3pPr>
+            <a:lvl4pPr marL="2527300" indent="-698500" defTabSz="825500">
+              <a:lnSpc>
+                <a:spcPct val="100000"/>
+              </a:lnSpc>
+              <a:spcBef>
+                <a:spcPts val="0"/>
+              </a:spcBef>
+              <a:defRPr b="1" sz="5500"/>
+            </a:lvl4pPr>
+            <a:lvl5pPr marL="3136900" indent="-698500" defTabSz="825500">
+              <a:lnSpc>
+                <a:spcPct val="100000"/>
+              </a:lnSpc>
+              <a:spcBef>
+                <a:spcPts val="0"/>
+              </a:spcBef>
+              <a:defRPr b="1" sz="5500"/>
+            </a:lvl5pPr>
           </a:lstStyle>
           <a:p>
             <a:pPr/>
             <a:r>
               <a:t>Slide Subtitle</a:t>
+            </a:r>
+          </a:p>
+          <a:p>
+            <a:pPr lvl="1"/>
+            <a:r>
+              <a:t/>
+            </a:r>
+          </a:p>
+          <a:p>
+            <a:pPr lvl="2"/>
+            <a:r>
+              <a:t/>
+            </a:r>
+          </a:p>
+          <a:p>
+            <a:pPr lvl="3"/>
+            <a:r>
+              <a:t/>
+            </a:r>
+          </a:p>
+          <a:p>
+            <a:pPr lvl="4"/>
+            <a:r>
+              <a:t/>
             </a:r>
           </a:p>
         </p:txBody>
@@ -2121,45 +2153,25 @@
           <p:cNvPr id="44" name="Body Level One…"/>
           <p:cNvSpPr txBox="1"/>
           <p:nvPr>
-            <p:ph type="body" idx="1" hasCustomPrompt="1"/>
+            <p:ph type="body" idx="21" hasCustomPrompt="1"/>
           </p:nvPr>
         </p:nvSpPr>
         <p:spPr>
+          <a:xfrm>
+            <a:off x="1206500" y="4248503"/>
+            <a:ext cx="21971000" cy="8256014"/>
+          </a:xfrm>
           <a:prstGeom prst="rect">
             <a:avLst/>
           </a:prstGeom>
         </p:spPr>
         <p:txBody>
-          <a:bodyPr/>
+          <a:bodyPr numCol="1" spcCol="38100"/>
           <a:lstStyle/>
           <a:p>
             <a:pPr/>
             <a:r>
               <a:t>Slide bullet text</a:t>
-            </a:r>
-          </a:p>
-          <a:p>
-            <a:pPr lvl="1"/>
-            <a:r>
-              <a:t/>
-            </a:r>
-          </a:p>
-          <a:p>
-            <a:pPr lvl="2"/>
-            <a:r>
-              <a:t/>
-            </a:r>
-          </a:p>
-          <a:p>
-            <a:pPr lvl="3"/>
-            <a:r>
-              <a:t/>
-            </a:r>
-          </a:p>
-          <a:p>
-            <a:pPr lvl="4"/>
-            <a:r>
-              <a:t/>
             </a:r>
           </a:p>
         </p:txBody>
@@ -2226,7 +2238,7 @@
           </a:prstGeom>
         </p:spPr>
         <p:txBody>
-          <a:bodyPr numCol="2" spcCol="1098550"/>
+          <a:bodyPr/>
           <a:lstStyle/>
           <a:p>
             <a:pPr/>
@@ -2310,23 +2322,23 @@
       </p:grpSpPr>
       <p:sp>
         <p:nvSpPr>
-          <p:cNvPr id="60" name="Slide Subtitle"/>
+          <p:cNvPr id="60" name="Body Level One…"/>
           <p:cNvSpPr txBox="1"/>
           <p:nvPr>
-            <p:ph type="body" sz="quarter" idx="21" hasCustomPrompt="1"/>
+            <p:ph type="body" sz="quarter" idx="1" hasCustomPrompt="1"/>
           </p:nvPr>
         </p:nvSpPr>
         <p:spPr>
           <a:xfrm>
-            <a:off x="1206500" y="2372962"/>
-            <a:ext cx="9779000" cy="934780"/>
+            <a:off x="1206500" y="2372961"/>
+            <a:ext cx="9779000" cy="934781"/>
           </a:xfrm>
           <a:prstGeom prst="rect">
             <a:avLst/>
           </a:prstGeom>
         </p:spPr>
         <p:txBody>
-          <a:bodyPr lIns="45719" tIns="45719" rIns="45719" bIns="45719"/>
+          <a:bodyPr lIns="45718" tIns="45718" rIns="45718" bIns="45718" numCol="1" spcCol="38100"/>
           <a:lstStyle>
             <a:lvl1pPr marL="0" indent="0" defTabSz="825500">
               <a:lnSpc>
@@ -2339,11 +2351,71 @@
               <a:buNone/>
               <a:defRPr b="1" sz="5500"/>
             </a:lvl1pPr>
+            <a:lvl2pPr marL="1308100" indent="-698500" defTabSz="825500">
+              <a:lnSpc>
+                <a:spcPct val="100000"/>
+              </a:lnSpc>
+              <a:spcBef>
+                <a:spcPts val="0"/>
+              </a:spcBef>
+              <a:defRPr b="1" sz="5500"/>
+            </a:lvl2pPr>
+            <a:lvl3pPr marL="1917700" indent="-698500" defTabSz="825500">
+              <a:lnSpc>
+                <a:spcPct val="100000"/>
+              </a:lnSpc>
+              <a:spcBef>
+                <a:spcPts val="0"/>
+              </a:spcBef>
+              <a:defRPr b="1" sz="5500"/>
+            </a:lvl3pPr>
+            <a:lvl4pPr marL="2527300" indent="-698500" defTabSz="825500">
+              <a:lnSpc>
+                <a:spcPct val="100000"/>
+              </a:lnSpc>
+              <a:spcBef>
+                <a:spcPts val="0"/>
+              </a:spcBef>
+              <a:defRPr b="1" sz="5500"/>
+            </a:lvl4pPr>
+            <a:lvl5pPr marL="3136900" indent="-698500" defTabSz="825500">
+              <a:lnSpc>
+                <a:spcPct val="100000"/>
+              </a:lnSpc>
+              <a:spcBef>
+                <a:spcPts val="0"/>
+              </a:spcBef>
+              <a:defRPr b="1" sz="5500"/>
+            </a:lvl5pPr>
           </a:lstStyle>
           <a:p>
             <a:pPr/>
             <a:r>
               <a:t>Slide Subtitle</a:t>
+            </a:r>
+          </a:p>
+          <a:p>
+            <a:pPr lvl="1"/>
+            <a:r>
+              <a:t/>
+            </a:r>
+          </a:p>
+          <a:p>
+            <a:pPr lvl="2"/>
+            <a:r>
+              <a:t/>
+            </a:r>
+          </a:p>
+          <a:p>
+            <a:pPr lvl="3"/>
+            <a:r>
+              <a:t/>
+            </a:r>
+          </a:p>
+          <a:p>
+            <a:pPr lvl="4"/>
+            <a:r>
+              <a:t/>
             </a:r>
           </a:p>
         </p:txBody>
@@ -2353,49 +2425,25 @@
           <p:cNvPr id="61" name="Body Level One…"/>
           <p:cNvSpPr txBox="1"/>
           <p:nvPr>
-            <p:ph type="body" sz="half" idx="1" hasCustomPrompt="1"/>
+            <p:ph type="body" sz="half" idx="21" hasCustomPrompt="1"/>
           </p:nvPr>
         </p:nvSpPr>
         <p:spPr>
           <a:xfrm>
-            <a:off x="1206500" y="4248504"/>
-            <a:ext cx="9779000" cy="8256630"/>
+            <a:off x="1206500" y="4248503"/>
+            <a:ext cx="9779000" cy="8256631"/>
           </a:xfrm>
           <a:prstGeom prst="rect">
             <a:avLst/>
           </a:prstGeom>
         </p:spPr>
         <p:txBody>
-          <a:bodyPr/>
+          <a:bodyPr numCol="1" spcCol="38100"/>
           <a:lstStyle/>
           <a:p>
             <a:pPr/>
             <a:r>
               <a:t>Slide bullet text</a:t>
-            </a:r>
-          </a:p>
-          <a:p>
-            <a:pPr lvl="1"/>
-            <a:r>
-              <a:t/>
-            </a:r>
-          </a:p>
-          <a:p>
-            <a:pPr lvl="2"/>
-            <a:r>
-              <a:t/>
-            </a:r>
-          </a:p>
-          <a:p>
-            <a:pPr lvl="3"/>
-            <a:r>
-              <a:t/>
-            </a:r>
-          </a:p>
-          <a:p>
-            <a:pPr lvl="4"/>
-            <a:r>
-              <a:t/>
             </a:r>
           </a:p>
         </p:txBody>
@@ -2411,14 +2459,14 @@
         <p:spPr>
           <a:xfrm>
             <a:off x="12192000" y="-407266"/>
-            <a:ext cx="10916874" cy="14555832"/>
+            <a:ext cx="10916874" cy="14555833"/>
           </a:xfrm>
           <a:prstGeom prst="rect">
             <a:avLst/>
           </a:prstGeom>
         </p:spPr>
         <p:txBody>
-          <a:bodyPr lIns="91439" tIns="45719" rIns="91439" bIns="45719">
+          <a:bodyPr lIns="91439" tIns="45719" rIns="91439" bIns="45719" numCol="1" spcCol="38100">
             <a:noAutofit/>
           </a:bodyPr>
           <a:lstStyle/>
@@ -2514,7 +2562,7 @@
         <p:spPr>
           <a:xfrm>
             <a:off x="1206496" y="4533900"/>
-            <a:ext cx="21971004" cy="4648200"/>
+            <a:ext cx="21971005" cy="4648200"/>
           </a:xfrm>
           <a:prstGeom prst="rect">
             <a:avLst/>
@@ -2550,8 +2598,8 @@
         </p:nvSpPr>
         <p:spPr>
           <a:xfrm>
-            <a:off x="12001499" y="13085233"/>
-            <a:ext cx="368505" cy="374600"/>
+            <a:off x="12001500" y="13085233"/>
+            <a:ext cx="368504" cy="374600"/>
           </a:xfrm>
           <a:prstGeom prst="rect">
             <a:avLst/>
@@ -2603,7 +2651,7 @@
         <p:spPr>
           <a:xfrm>
             <a:off x="1206500" y="1079500"/>
-            <a:ext cx="21971000" cy="1434949"/>
+            <a:ext cx="21971000" cy="1434950"/>
           </a:xfrm>
           <a:prstGeom prst="rect">
             <a:avLst/>
@@ -2622,23 +2670,23 @@
       </p:sp>
       <p:sp>
         <p:nvSpPr>
-          <p:cNvPr id="80" name="Slide Subtitle"/>
+          <p:cNvPr id="80" name="Body Level One…"/>
           <p:cNvSpPr txBox="1"/>
           <p:nvPr>
-            <p:ph type="body" sz="quarter" idx="21" hasCustomPrompt="1"/>
+            <p:ph type="body" sz="quarter" idx="1" hasCustomPrompt="1"/>
           </p:nvPr>
         </p:nvSpPr>
         <p:spPr>
           <a:xfrm>
-            <a:off x="1206500" y="2372962"/>
-            <a:ext cx="21971000" cy="934780"/>
+            <a:off x="1206500" y="2372961"/>
+            <a:ext cx="21971000" cy="934781"/>
           </a:xfrm>
           <a:prstGeom prst="rect">
             <a:avLst/>
           </a:prstGeom>
         </p:spPr>
         <p:txBody>
-          <a:bodyPr lIns="45719" tIns="45719" rIns="45719" bIns="45719"/>
+          <a:bodyPr lIns="45718" tIns="45718" rIns="45718" bIns="45718" numCol="1" spcCol="38100"/>
           <a:lstStyle>
             <a:lvl1pPr marL="0" indent="0" defTabSz="825500">
               <a:lnSpc>
@@ -2651,11 +2699,71 @@
               <a:buNone/>
               <a:defRPr b="1" sz="5500"/>
             </a:lvl1pPr>
+            <a:lvl2pPr marL="1308100" indent="-698500" defTabSz="825500">
+              <a:lnSpc>
+                <a:spcPct val="100000"/>
+              </a:lnSpc>
+              <a:spcBef>
+                <a:spcPts val="0"/>
+              </a:spcBef>
+              <a:defRPr b="1" sz="5500"/>
+            </a:lvl2pPr>
+            <a:lvl3pPr marL="1917700" indent="-698500" defTabSz="825500">
+              <a:lnSpc>
+                <a:spcPct val="100000"/>
+              </a:lnSpc>
+              <a:spcBef>
+                <a:spcPts val="0"/>
+              </a:spcBef>
+              <a:defRPr b="1" sz="5500"/>
+            </a:lvl3pPr>
+            <a:lvl4pPr marL="2527300" indent="-698500" defTabSz="825500">
+              <a:lnSpc>
+                <a:spcPct val="100000"/>
+              </a:lnSpc>
+              <a:spcBef>
+                <a:spcPts val="0"/>
+              </a:spcBef>
+              <a:defRPr b="1" sz="5500"/>
+            </a:lvl4pPr>
+            <a:lvl5pPr marL="3136900" indent="-698500" defTabSz="825500">
+              <a:lnSpc>
+                <a:spcPct val="100000"/>
+              </a:lnSpc>
+              <a:spcBef>
+                <a:spcPts val="0"/>
+              </a:spcBef>
+              <a:defRPr b="1" sz="5500"/>
+            </a:lvl5pPr>
           </a:lstStyle>
           <a:p>
             <a:pPr/>
             <a:r>
               <a:t>Slide Subtitle</a:t>
+            </a:r>
+          </a:p>
+          <a:p>
+            <a:pPr lvl="1"/>
+            <a:r>
+              <a:t/>
+            </a:r>
+          </a:p>
+          <a:p>
+            <a:pPr lvl="2"/>
+            <a:r>
+              <a:t/>
+            </a:r>
+          </a:p>
+          <a:p>
+            <a:pPr lvl="3"/>
+            <a:r>
+              <a:t/>
+            </a:r>
+          </a:p>
+          <a:p>
+            <a:pPr lvl="4"/>
+            <a:r>
+              <a:t/>
             </a:r>
           </a:p>
         </p:txBody>
@@ -2738,23 +2846,23 @@
       </p:sp>
       <p:sp>
         <p:nvSpPr>
-          <p:cNvPr id="89" name="Agenda Subtitle"/>
+          <p:cNvPr id="89" name="Body Level One…"/>
           <p:cNvSpPr txBox="1"/>
           <p:nvPr>
-            <p:ph type="body" sz="quarter" idx="21" hasCustomPrompt="1"/>
+            <p:ph type="body" sz="quarter" idx="1" hasCustomPrompt="1"/>
           </p:nvPr>
         </p:nvSpPr>
         <p:spPr>
           <a:xfrm>
-            <a:off x="1206500" y="2372962"/>
-            <a:ext cx="21971000" cy="934780"/>
+            <a:off x="1206500" y="2372961"/>
+            <a:ext cx="21971000" cy="934781"/>
           </a:xfrm>
           <a:prstGeom prst="rect">
             <a:avLst/>
           </a:prstGeom>
         </p:spPr>
         <p:txBody>
-          <a:bodyPr lIns="45719" tIns="45719" rIns="45719" bIns="45719"/>
+          <a:bodyPr lIns="45718" tIns="45718" rIns="45718" bIns="45718" numCol="1" spcCol="38100"/>
           <a:lstStyle>
             <a:lvl1pPr marL="0" indent="0" defTabSz="825500">
               <a:lnSpc>
@@ -2767,11 +2875,71 @@
               <a:buNone/>
               <a:defRPr b="1" sz="5500"/>
             </a:lvl1pPr>
+            <a:lvl2pPr marL="1308100" indent="-698500" defTabSz="825500">
+              <a:lnSpc>
+                <a:spcPct val="100000"/>
+              </a:lnSpc>
+              <a:spcBef>
+                <a:spcPts val="0"/>
+              </a:spcBef>
+              <a:defRPr b="1" sz="5500"/>
+            </a:lvl2pPr>
+            <a:lvl3pPr marL="1917700" indent="-698500" defTabSz="825500">
+              <a:lnSpc>
+                <a:spcPct val="100000"/>
+              </a:lnSpc>
+              <a:spcBef>
+                <a:spcPts val="0"/>
+              </a:spcBef>
+              <a:defRPr b="1" sz="5500"/>
+            </a:lvl3pPr>
+            <a:lvl4pPr marL="2527300" indent="-698500" defTabSz="825500">
+              <a:lnSpc>
+                <a:spcPct val="100000"/>
+              </a:lnSpc>
+              <a:spcBef>
+                <a:spcPts val="0"/>
+              </a:spcBef>
+              <a:defRPr b="1" sz="5500"/>
+            </a:lvl4pPr>
+            <a:lvl5pPr marL="3136900" indent="-698500" defTabSz="825500">
+              <a:lnSpc>
+                <a:spcPct val="100000"/>
+              </a:lnSpc>
+              <a:spcBef>
+                <a:spcPts val="0"/>
+              </a:spcBef>
+              <a:defRPr b="1" sz="5500"/>
+            </a:lvl5pPr>
           </a:lstStyle>
           <a:p>
             <a:pPr/>
             <a:r>
               <a:t>Agenda Subtitle</a:t>
+            </a:r>
+          </a:p>
+          <a:p>
+            <a:pPr lvl="1"/>
+            <a:r>
+              <a:t/>
+            </a:r>
+          </a:p>
+          <a:p>
+            <a:pPr lvl="2"/>
+            <a:r>
+              <a:t/>
+            </a:r>
+          </a:p>
+          <a:p>
+            <a:pPr lvl="3"/>
+            <a:r>
+              <a:t/>
+            </a:r>
+          </a:p>
+          <a:p>
+            <a:pPr lvl="4"/>
+            <a:r>
+              <a:t/>
             </a:r>
           </a:p>
         </p:txBody>
@@ -2781,16 +2949,20 @@
           <p:cNvPr id="90" name="Body Level One…"/>
           <p:cNvSpPr txBox="1"/>
           <p:nvPr>
-            <p:ph type="body" idx="1" hasCustomPrompt="1"/>
+            <p:ph type="body" idx="21" hasCustomPrompt="1"/>
           </p:nvPr>
         </p:nvSpPr>
         <p:spPr>
+          <a:xfrm>
+            <a:off x="1206500" y="4248503"/>
+            <a:ext cx="21971000" cy="8256014"/>
+          </a:xfrm>
           <a:prstGeom prst="rect">
             <a:avLst/>
           </a:prstGeom>
         </p:spPr>
         <p:txBody>
-          <a:bodyPr/>
+          <a:bodyPr numCol="1" spcCol="38100"/>
           <a:lstStyle>
             <a:lvl1pPr marL="0" indent="0" defTabSz="825500">
               <a:lnSpc>
@@ -2801,81 +2973,13 @@
               </a:spcBef>
               <a:buSzTx/>
               <a:buNone/>
-              <a:defRPr spc="-55" sz="5500"/>
+              <a:defRPr spc="-99" sz="5500"/>
             </a:lvl1pPr>
-            <a:lvl2pPr marL="0" indent="457200" defTabSz="825500">
-              <a:lnSpc>
-                <a:spcPct val="100000"/>
-              </a:lnSpc>
-              <a:spcBef>
-                <a:spcPts val="1800"/>
-              </a:spcBef>
-              <a:buSzTx/>
-              <a:buNone/>
-              <a:defRPr spc="-55" sz="5500"/>
-            </a:lvl2pPr>
-            <a:lvl3pPr marL="0" indent="914400" defTabSz="825500">
-              <a:lnSpc>
-                <a:spcPct val="100000"/>
-              </a:lnSpc>
-              <a:spcBef>
-                <a:spcPts val="1800"/>
-              </a:spcBef>
-              <a:buSzTx/>
-              <a:buNone/>
-              <a:defRPr spc="-55" sz="5500"/>
-            </a:lvl3pPr>
-            <a:lvl4pPr marL="0" indent="1371600" defTabSz="825500">
-              <a:lnSpc>
-                <a:spcPct val="100000"/>
-              </a:lnSpc>
-              <a:spcBef>
-                <a:spcPts val="1800"/>
-              </a:spcBef>
-              <a:buSzTx/>
-              <a:buNone/>
-              <a:defRPr spc="-55" sz="5500"/>
-            </a:lvl4pPr>
-            <a:lvl5pPr marL="0" indent="1828800" defTabSz="825500">
-              <a:lnSpc>
-                <a:spcPct val="100000"/>
-              </a:lnSpc>
-              <a:spcBef>
-                <a:spcPts val="1800"/>
-              </a:spcBef>
-              <a:buSzTx/>
-              <a:buNone/>
-              <a:defRPr spc="-55" sz="5500"/>
-            </a:lvl5pPr>
           </a:lstStyle>
           <a:p>
             <a:pPr/>
             <a:r>
               <a:t>Agenda Topics</a:t>
-            </a:r>
-          </a:p>
-          <a:p>
-            <a:pPr lvl="1"/>
-            <a:r>
-              <a:t/>
-            </a:r>
-          </a:p>
-          <a:p>
-            <a:pPr lvl="2"/>
-            <a:r>
-              <a:t/>
-            </a:r>
-          </a:p>
-          <a:p>
-            <a:pPr lvl="3"/>
-            <a:r>
-              <a:t/>
-            </a:r>
-          </a:p>
-          <a:p>
-            <a:pPr lvl="4"/>
-            <a:r>
-              <a:t/>
             </a:r>
           </a:p>
         </p:txBody>
@@ -2937,16 +3041,78 @@
       </p:grpSpPr>
       <p:sp>
         <p:nvSpPr>
-          <p:cNvPr id="2" name="Slide Title"/>
+          <p:cNvPr id="2" name="Body Level One…"/>
           <p:cNvSpPr txBox="1"/>
           <p:nvPr>
-            <p:ph type="title" hasCustomPrompt="1"/>
+            <p:ph type="body" idx="1" hasCustomPrompt="1"/>
           </p:nvPr>
         </p:nvSpPr>
         <p:spPr>
           <a:xfrm>
-            <a:off x="1206500" y="1079500"/>
-            <a:ext cx="21971000" cy="1433163"/>
+            <a:off x="1206500" y="4248503"/>
+            <a:ext cx="21971000" cy="8256014"/>
+          </a:xfrm>
+          <a:prstGeom prst="rect">
+            <a:avLst/>
+          </a:prstGeom>
+          <a:ln w="12700">
+            <a:miter lim="400000"/>
+          </a:ln>
+          <a:extLst>
+            <a:ext uri="{C572A759-6A51-4108-AA02-DFA0A04FC94B}">
+              <ma14:wrappingTextBoxFlag xmlns:ma14="http://schemas.microsoft.com/office/mac/drawingml/2011/main" val="1"/>
+            </a:ext>
+          </a:extLst>
+        </p:spPr>
+        <p:txBody>
+          <a:bodyPr lIns="50800" tIns="50800" rIns="50800" bIns="50800" numCol="2" spcCol="1098550">
+            <a:normAutofit fontScale="100000" lnSpcReduction="0"/>
+          </a:bodyPr>
+          <a:lstStyle/>
+          <a:p>
+            <a:pPr/>
+            <a:r>
+              <a:t>Slide bullet text</a:t>
+            </a:r>
+          </a:p>
+          <a:p>
+            <a:pPr lvl="1"/>
+            <a:r>
+              <a:t/>
+            </a:r>
+          </a:p>
+          <a:p>
+            <a:pPr lvl="2"/>
+            <a:r>
+              <a:t/>
+            </a:r>
+          </a:p>
+          <a:p>
+            <a:pPr lvl="3"/>
+            <a:r>
+              <a:t/>
+            </a:r>
+          </a:p>
+          <a:p>
+            <a:pPr lvl="4"/>
+            <a:r>
+              <a:t/>
+            </a:r>
+          </a:p>
+        </p:txBody>
+      </p:sp>
+      <p:sp>
+        <p:nvSpPr>
+          <p:cNvPr id="3" name="Title Text"/>
+          <p:cNvSpPr txBox="1"/>
+          <p:nvPr>
+            <p:ph type="title"/>
+          </p:nvPr>
+        </p:nvSpPr>
+        <p:spPr>
+          <a:xfrm>
+            <a:off x="3653366" y="2743200"/>
+            <a:ext cx="19507201" cy="1505304"/>
           </a:xfrm>
           <a:prstGeom prst="rect">
             <a:avLst/>
@@ -2968,69 +3134,7 @@
           <a:p>
             <a:pPr/>
             <a:r>
-              <a:t>Slide Title</a:t>
-            </a:r>
-          </a:p>
-        </p:txBody>
-      </p:sp>
-      <p:sp>
-        <p:nvSpPr>
-          <p:cNvPr id="3" name="Body Level One…"/>
-          <p:cNvSpPr txBox="1"/>
-          <p:nvPr>
-            <p:ph type="body" idx="1" hasCustomPrompt="1"/>
-          </p:nvPr>
-        </p:nvSpPr>
-        <p:spPr>
-          <a:xfrm>
-            <a:off x="1206500" y="4248504"/>
-            <a:ext cx="21971000" cy="8256012"/>
-          </a:xfrm>
-          <a:prstGeom prst="rect">
-            <a:avLst/>
-          </a:prstGeom>
-          <a:ln w="12700">
-            <a:miter lim="400000"/>
-          </a:ln>
-          <a:extLst>
-            <a:ext uri="{C572A759-6A51-4108-AA02-DFA0A04FC94B}">
-              <ma14:wrappingTextBoxFlag xmlns:ma14="http://schemas.microsoft.com/office/mac/drawingml/2011/main" val="1"/>
-            </a:ext>
-          </a:extLst>
-        </p:spPr>
-        <p:txBody>
-          <a:bodyPr lIns="50800" tIns="50800" rIns="50800" bIns="50800">
-            <a:normAutofit fontScale="100000" lnSpcReduction="0"/>
-          </a:bodyPr>
-          <a:lstStyle/>
-          <a:p>
-            <a:pPr/>
-            <a:r>
-              <a:t>Slide bullet text</a:t>
-            </a:r>
-          </a:p>
-          <a:p>
-            <a:pPr lvl="1"/>
-            <a:r>
-              <a:t/>
-            </a:r>
-          </a:p>
-          <a:p>
-            <a:pPr lvl="2"/>
-            <a:r>
-              <a:t/>
-            </a:r>
-          </a:p>
-          <a:p>
-            <a:pPr lvl="3"/>
-            <a:r>
-              <a:t/>
-            </a:r>
-          </a:p>
-          <a:p>
-            <a:pPr lvl="4"/>
-            <a:r>
-              <a:t/>
+              <a:t>Title Text</a:t>
             </a:r>
           </a:p>
         </p:txBody>
@@ -3045,8 +3149,8 @@
         </p:nvSpPr>
         <p:spPr>
           <a:xfrm>
-            <a:off x="12001499" y="13080999"/>
-            <a:ext cx="368505" cy="374600"/>
+            <a:off x="12001500" y="13080999"/>
+            <a:ext cx="368504" cy="374600"/>
           </a:xfrm>
           <a:prstGeom prst="rect">
             <a:avLst/>
@@ -3097,7 +3201,7 @@
   <p:transition xmlns:p14="http://schemas.microsoft.com/office/powerpoint/2010/main" spd="med" advClick="1"/>
   <p:txStyles>
     <p:titleStyle>
-      <a:lvl1pPr marL="0" marR="0" indent="0" algn="l" defTabSz="2438338" rtl="0" latinLnBrk="0">
+      <a:lvl1pPr marL="0" marR="0" indent="0" algn="l" defTabSz="2438337" rtl="0" latinLnBrk="0">
         <a:lnSpc>
           <a:spcPct val="80000"/>
         </a:lnSpc>
@@ -3123,7 +3227,7 @@
           <a:sym typeface="Helvetica Neue"/>
         </a:defRPr>
       </a:lvl1pPr>
-      <a:lvl2pPr marL="0" marR="0" indent="457200" algn="l" defTabSz="2438338" rtl="0" latinLnBrk="0">
+      <a:lvl2pPr marL="0" marR="0" indent="0" algn="l" defTabSz="2438337" rtl="0" latinLnBrk="0">
         <a:lnSpc>
           <a:spcPct val="80000"/>
         </a:lnSpc>
@@ -3149,7 +3253,7 @@
           <a:sym typeface="Helvetica Neue"/>
         </a:defRPr>
       </a:lvl2pPr>
-      <a:lvl3pPr marL="0" marR="0" indent="914400" algn="l" defTabSz="2438338" rtl="0" latinLnBrk="0">
+      <a:lvl3pPr marL="0" marR="0" indent="0" algn="l" defTabSz="2438337" rtl="0" latinLnBrk="0">
         <a:lnSpc>
           <a:spcPct val="80000"/>
         </a:lnSpc>
@@ -3175,7 +3279,7 @@
           <a:sym typeface="Helvetica Neue"/>
         </a:defRPr>
       </a:lvl3pPr>
-      <a:lvl4pPr marL="0" marR="0" indent="1371600" algn="l" defTabSz="2438338" rtl="0" latinLnBrk="0">
+      <a:lvl4pPr marL="0" marR="0" indent="0" algn="l" defTabSz="2438337" rtl="0" latinLnBrk="0">
         <a:lnSpc>
           <a:spcPct val="80000"/>
         </a:lnSpc>
@@ -3201,7 +3305,7 @@
           <a:sym typeface="Helvetica Neue"/>
         </a:defRPr>
       </a:lvl4pPr>
-      <a:lvl5pPr marL="0" marR="0" indent="1828800" algn="l" defTabSz="2438338" rtl="0" latinLnBrk="0">
+      <a:lvl5pPr marL="0" marR="0" indent="0" algn="l" defTabSz="2438337" rtl="0" latinLnBrk="0">
         <a:lnSpc>
           <a:spcPct val="80000"/>
         </a:lnSpc>
@@ -3227,7 +3331,7 @@
           <a:sym typeface="Helvetica Neue"/>
         </a:defRPr>
       </a:lvl5pPr>
-      <a:lvl6pPr marL="0" marR="0" indent="2286000" algn="l" defTabSz="2438338" rtl="0" latinLnBrk="0">
+      <a:lvl6pPr marL="0" marR="0" indent="0" algn="l" defTabSz="2438337" rtl="0" latinLnBrk="0">
         <a:lnSpc>
           <a:spcPct val="80000"/>
         </a:lnSpc>
@@ -3253,7 +3357,7 @@
           <a:sym typeface="Helvetica Neue"/>
         </a:defRPr>
       </a:lvl6pPr>
-      <a:lvl7pPr marL="0" marR="0" indent="2743200" algn="l" defTabSz="2438338" rtl="0" latinLnBrk="0">
+      <a:lvl7pPr marL="0" marR="0" indent="0" algn="l" defTabSz="2438337" rtl="0" latinLnBrk="0">
         <a:lnSpc>
           <a:spcPct val="80000"/>
         </a:lnSpc>
@@ -3279,7 +3383,7 @@
           <a:sym typeface="Helvetica Neue"/>
         </a:defRPr>
       </a:lvl7pPr>
-      <a:lvl8pPr marL="0" marR="0" indent="3200400" algn="l" defTabSz="2438338" rtl="0" latinLnBrk="0">
+      <a:lvl8pPr marL="0" marR="0" indent="0" algn="l" defTabSz="2438337" rtl="0" latinLnBrk="0">
         <a:lnSpc>
           <a:spcPct val="80000"/>
         </a:lnSpc>
@@ -3305,7 +3409,7 @@
           <a:sym typeface="Helvetica Neue"/>
         </a:defRPr>
       </a:lvl8pPr>
-      <a:lvl9pPr marL="0" marR="0" indent="3657600" algn="l" defTabSz="2438338" rtl="0" latinLnBrk="0">
+      <a:lvl9pPr marL="0" marR="0" indent="0" algn="l" defTabSz="2438337" rtl="0" latinLnBrk="0">
         <a:lnSpc>
           <a:spcPct val="80000"/>
         </a:lnSpc>
@@ -3333,7 +3437,7 @@
       </a:lvl9pPr>
     </p:titleStyle>
     <p:bodyStyle>
-      <a:lvl1pPr marL="609600" marR="0" indent="-609600" algn="l" defTabSz="2438338" rtl="0" latinLnBrk="0">
+      <a:lvl1pPr marL="609600" marR="0" indent="-609600" algn="l" defTabSz="2438337" rtl="0" latinLnBrk="0">
         <a:lnSpc>
           <a:spcPct val="90000"/>
         </a:lnSpc>
@@ -3359,7 +3463,7 @@
           <a:sym typeface="Helvetica Neue"/>
         </a:defRPr>
       </a:lvl1pPr>
-      <a:lvl2pPr marL="1219200" marR="0" indent="-609600" algn="l" defTabSz="2438338" rtl="0" latinLnBrk="0">
+      <a:lvl2pPr marL="1219200" marR="0" indent="-609600" algn="l" defTabSz="2438337" rtl="0" latinLnBrk="0">
         <a:lnSpc>
           <a:spcPct val="90000"/>
         </a:lnSpc>
@@ -3385,7 +3489,7 @@
           <a:sym typeface="Helvetica Neue"/>
         </a:defRPr>
       </a:lvl2pPr>
-      <a:lvl3pPr marL="1828800" marR="0" indent="-609600" algn="l" defTabSz="2438338" rtl="0" latinLnBrk="0">
+      <a:lvl3pPr marL="1828800" marR="0" indent="-609600" algn="l" defTabSz="2438337" rtl="0" latinLnBrk="0">
         <a:lnSpc>
           <a:spcPct val="90000"/>
         </a:lnSpc>
@@ -3411,7 +3515,7 @@
           <a:sym typeface="Helvetica Neue"/>
         </a:defRPr>
       </a:lvl3pPr>
-      <a:lvl4pPr marL="2438400" marR="0" indent="-609600" algn="l" defTabSz="2438338" rtl="0" latinLnBrk="0">
+      <a:lvl4pPr marL="2438400" marR="0" indent="-609600" algn="l" defTabSz="2438337" rtl="0" latinLnBrk="0">
         <a:lnSpc>
           <a:spcPct val="90000"/>
         </a:lnSpc>
@@ -3437,7 +3541,7 @@
           <a:sym typeface="Helvetica Neue"/>
         </a:defRPr>
       </a:lvl4pPr>
-      <a:lvl5pPr marL="3048000" marR="0" indent="-609600" algn="l" defTabSz="2438338" rtl="0" latinLnBrk="0">
+      <a:lvl5pPr marL="3048000" marR="0" indent="-609600" algn="l" defTabSz="2438337" rtl="0" latinLnBrk="0">
         <a:lnSpc>
           <a:spcPct val="90000"/>
         </a:lnSpc>
@@ -3463,7 +3567,7 @@
           <a:sym typeface="Helvetica Neue"/>
         </a:defRPr>
       </a:lvl5pPr>
-      <a:lvl6pPr marL="3657600" marR="0" indent="-609600" algn="l" defTabSz="2438338" rtl="0" latinLnBrk="0">
+      <a:lvl6pPr marL="3657600" marR="0" indent="-609600" algn="l" defTabSz="2438337" rtl="0" latinLnBrk="0">
         <a:lnSpc>
           <a:spcPct val="90000"/>
         </a:lnSpc>
@@ -3489,7 +3593,7 @@
           <a:sym typeface="Helvetica Neue"/>
         </a:defRPr>
       </a:lvl6pPr>
-      <a:lvl7pPr marL="4267200" marR="0" indent="-609600" algn="l" defTabSz="2438338" rtl="0" latinLnBrk="0">
+      <a:lvl7pPr marL="4267200" marR="0" indent="-609600" algn="l" defTabSz="2438337" rtl="0" latinLnBrk="0">
         <a:lnSpc>
           <a:spcPct val="90000"/>
         </a:lnSpc>
@@ -3515,7 +3619,7 @@
           <a:sym typeface="Helvetica Neue"/>
         </a:defRPr>
       </a:lvl7pPr>
-      <a:lvl8pPr marL="4876800" marR="0" indent="-609600" algn="l" defTabSz="2438338" rtl="0" latinLnBrk="0">
+      <a:lvl8pPr marL="4876800" marR="0" indent="-609600" algn="l" defTabSz="2438337" rtl="0" latinLnBrk="0">
         <a:lnSpc>
           <a:spcPct val="90000"/>
         </a:lnSpc>
@@ -3541,7 +3645,7 @@
           <a:sym typeface="Helvetica Neue"/>
         </a:defRPr>
       </a:lvl8pPr>
-      <a:lvl9pPr marL="5486400" marR="0" indent="-609600" algn="l" defTabSz="2438338" rtl="0" latinLnBrk="0">
+      <a:lvl9pPr marL="5486400" marR="0" indent="-609600" algn="l" defTabSz="2438337" rtl="0" latinLnBrk="0">
         <a:lnSpc>
           <a:spcPct val="90000"/>
         </a:lnSpc>
@@ -3595,7 +3699,7 @@
           <a:sym typeface="Helvetica Neue"/>
         </a:defRPr>
       </a:lvl1pPr>
-      <a:lvl2pPr marL="0" marR="0" indent="457200" algn="ctr" defTabSz="584200" rtl="0" latinLnBrk="0">
+      <a:lvl2pPr marL="0" marR="0" indent="0" algn="ctr" defTabSz="584200" rtl="0" latinLnBrk="0">
         <a:lnSpc>
           <a:spcPct val="100000"/>
         </a:lnSpc>
@@ -3621,7 +3725,7 @@
           <a:sym typeface="Helvetica Neue"/>
         </a:defRPr>
       </a:lvl2pPr>
-      <a:lvl3pPr marL="0" marR="0" indent="914400" algn="ctr" defTabSz="584200" rtl="0" latinLnBrk="0">
+      <a:lvl3pPr marL="0" marR="0" indent="0" algn="ctr" defTabSz="584200" rtl="0" latinLnBrk="0">
         <a:lnSpc>
           <a:spcPct val="100000"/>
         </a:lnSpc>
@@ -3647,7 +3751,7 @@
           <a:sym typeface="Helvetica Neue"/>
         </a:defRPr>
       </a:lvl3pPr>
-      <a:lvl4pPr marL="0" marR="0" indent="1371600" algn="ctr" defTabSz="584200" rtl="0" latinLnBrk="0">
+      <a:lvl4pPr marL="0" marR="0" indent="0" algn="ctr" defTabSz="584200" rtl="0" latinLnBrk="0">
         <a:lnSpc>
           <a:spcPct val="100000"/>
         </a:lnSpc>
@@ -3673,7 +3777,7 @@
           <a:sym typeface="Helvetica Neue"/>
         </a:defRPr>
       </a:lvl4pPr>
-      <a:lvl5pPr marL="0" marR="0" indent="1828800" algn="ctr" defTabSz="584200" rtl="0" latinLnBrk="0">
+      <a:lvl5pPr marL="0" marR="0" indent="0" algn="ctr" defTabSz="584200" rtl="0" latinLnBrk="0">
         <a:lnSpc>
           <a:spcPct val="100000"/>
         </a:lnSpc>
@@ -3699,7 +3803,7 @@
           <a:sym typeface="Helvetica Neue"/>
         </a:defRPr>
       </a:lvl5pPr>
-      <a:lvl6pPr marL="0" marR="0" indent="2286000" algn="ctr" defTabSz="584200" rtl="0" latinLnBrk="0">
+      <a:lvl6pPr marL="0" marR="0" indent="0" algn="ctr" defTabSz="584200" rtl="0" latinLnBrk="0">
         <a:lnSpc>
           <a:spcPct val="100000"/>
         </a:lnSpc>
@@ -3725,7 +3829,7 @@
           <a:sym typeface="Helvetica Neue"/>
         </a:defRPr>
       </a:lvl6pPr>
-      <a:lvl7pPr marL="0" marR="0" indent="2743200" algn="ctr" defTabSz="584200" rtl="0" latinLnBrk="0">
+      <a:lvl7pPr marL="0" marR="0" indent="0" algn="ctr" defTabSz="584200" rtl="0" latinLnBrk="0">
         <a:lnSpc>
           <a:spcPct val="100000"/>
         </a:lnSpc>
@@ -3751,7 +3855,7 @@
           <a:sym typeface="Helvetica Neue"/>
         </a:defRPr>
       </a:lvl7pPr>
-      <a:lvl8pPr marL="0" marR="0" indent="3200400" algn="ctr" defTabSz="584200" rtl="0" latinLnBrk="0">
+      <a:lvl8pPr marL="0" marR="0" indent="0" algn="ctr" defTabSz="584200" rtl="0" latinLnBrk="0">
         <a:lnSpc>
           <a:spcPct val="100000"/>
         </a:lnSpc>
@@ -3777,7 +3881,7 @@
           <a:sym typeface="Helvetica Neue"/>
         </a:defRPr>
       </a:lvl8pPr>
-      <a:lvl9pPr marL="0" marR="0" indent="3657600" algn="ctr" defTabSz="584200" rtl="0" latinLnBrk="0">
+      <a:lvl9pPr marL="0" marR="0" indent="0" algn="ctr" defTabSz="584200" rtl="0" latinLnBrk="0">
         <a:lnSpc>
           <a:spcPct val="100000"/>
         </a:lnSpc>
@@ -3830,13 +3934,78 @@
           <p:cNvPr id="151" name="Nandita Sudha Tiwari &amp; John Batarekh"/>
           <p:cNvSpPr txBox="1"/>
           <p:nvPr>
-            <p:ph type="body" idx="21"/>
+            <p:ph type="body" sz="quarter" idx="1"/>
           </p:nvPr>
         </p:nvSpPr>
         <p:spPr>
+          <a:xfrm>
+            <a:off x="1201341" y="11859862"/>
+            <a:ext cx="21971002" cy="636980"/>
+          </a:xfrm>
           <a:prstGeom prst="rect">
             <a:avLst/>
           </a:prstGeom>
+        </p:spPr>
+        <p:txBody>
+          <a:bodyPr/>
+          <a:lstStyle/>
+          <a:p>
+            <a:pPr/>
+            <a:r>
+              <a:t>Nandita Sudha Tiwari &amp; John Batarekh</a:t>
+            </a:r>
+          </a:p>
+        </p:txBody>
+      </p:sp>
+      <p:sp>
+        <p:nvSpPr>
+          <p:cNvPr id="152" name="Finite Difference Method"/>
+          <p:cNvSpPr txBox="1"/>
+          <p:nvPr>
+            <p:ph type="title"/>
+          </p:nvPr>
+        </p:nvSpPr>
+        <p:spPr>
+          <a:xfrm>
+            <a:off x="1206495" y="2574990"/>
+            <a:ext cx="21971006" cy="4648203"/>
+          </a:xfrm>
+          <a:prstGeom prst="rect">
+            <a:avLst/>
+          </a:prstGeom>
+        </p:spPr>
+        <p:txBody>
+          <a:bodyPr/>
+          <a:lstStyle>
+            <a:lvl1pPr>
+              <a:defRPr spc="-300"/>
+            </a:lvl1pPr>
+          </a:lstStyle>
+          <a:p>
+            <a:pPr/>
+            <a:r>
+              <a:t>Finite Difference Method</a:t>
+            </a:r>
+          </a:p>
+        </p:txBody>
+      </p:sp>
+      <p:sp>
+        <p:nvSpPr>
+          <p:cNvPr id="153" name="For Solving the 1-D Heat Equation"/>
+          <p:cNvSpPr txBox="1"/>
+          <p:nvPr/>
+        </p:nvSpPr>
+        <p:spPr>
+          <a:xfrm>
+            <a:off x="1201342" y="7223190"/>
+            <a:ext cx="21971002" cy="1905002"/>
+          </a:xfrm>
+          <a:prstGeom prst="rect">
+            <a:avLst/>
+          </a:prstGeom>
+          <a:ln w="12700">
+            <a:miter lim="400000"/>
+          </a:ln>
           <a:extLst>
             <a:ext uri="{C572A759-6A51-4108-AA02-DFA0A04FC94B}">
               <ma14:wrappingTextBoxFlag xmlns:ma14="http://schemas.microsoft.com/office/mac/drawingml/2011/main" val="1"/>
@@ -3844,56 +4013,18 @@
           </a:extLst>
         </p:spPr>
         <p:txBody>
-          <a:bodyPr/>
-          <a:lstStyle/>
-          <a:p>
-            <a:pPr/>
-            <a:r>
-              <a:t>Nandita Sudha Tiwari &amp; John Batarekh</a:t>
-            </a:r>
-          </a:p>
-        </p:txBody>
-      </p:sp>
-      <p:sp>
-        <p:nvSpPr>
-          <p:cNvPr id="152" name="Finite Difference Method"/>
-          <p:cNvSpPr txBox="1"/>
-          <p:nvPr>
-            <p:ph type="ctrTitle"/>
-          </p:nvPr>
-        </p:nvSpPr>
-        <p:spPr>
-          <a:prstGeom prst="rect">
-            <a:avLst/>
-          </a:prstGeom>
-        </p:spPr>
-        <p:txBody>
-          <a:bodyPr/>
-          <a:lstStyle/>
-          <a:p>
-            <a:pPr/>
-            <a:r>
-              <a:t>Finite Difference Method</a:t>
-            </a:r>
-          </a:p>
-        </p:txBody>
-      </p:sp>
-      <p:sp>
-        <p:nvSpPr>
-          <p:cNvPr id="153" name="For Solving the 1-D Heat Equation"/>
-          <p:cNvSpPr txBox="1"/>
-          <p:nvPr>
-            <p:ph type="subTitle" sz="quarter" idx="1"/>
-          </p:nvPr>
-        </p:nvSpPr>
-        <p:spPr>
-          <a:prstGeom prst="rect">
-            <a:avLst/>
-          </a:prstGeom>
-        </p:spPr>
-        <p:txBody>
-          <a:bodyPr/>
-          <a:lstStyle/>
+          <a:bodyPr lIns="50800" tIns="50800" rIns="50800" bIns="50800">
+            <a:normAutofit fontScale="100000" lnSpcReduction="0"/>
+          </a:bodyPr>
+          <a:lstStyle>
+            <a:lvl1pPr algn="l" defTabSz="825500">
+              <a:defRPr b="1" sz="5500">
+                <a:solidFill>
+                  <a:srgbClr val="000000"/>
+                </a:solidFill>
+              </a:defRPr>
+            </a:lvl1pPr>
+          </a:lstStyle>
           <a:p>
             <a:pPr/>
             <a:r>
@@ -3937,13 +4068,21 @@
           </p:nvPr>
         </p:nvSpPr>
         <p:spPr>
+          <a:xfrm>
+            <a:off x="1206500" y="1079499"/>
+            <a:ext cx="21971000" cy="1433165"/>
+          </a:xfrm>
           <a:prstGeom prst="rect">
             <a:avLst/>
           </a:prstGeom>
         </p:spPr>
         <p:txBody>
           <a:bodyPr/>
-          <a:lstStyle/>
+          <a:lstStyle>
+            <a:lvl1pPr>
+              <a:defRPr spc="-200"/>
+            </a:lvl1pPr>
+          </a:lstStyle>
           <a:p>
             <a:pPr/>
             <a:r>
@@ -3961,15 +4100,29 @@
           </p:nvPr>
         </p:nvSpPr>
         <p:spPr>
+          <a:xfrm>
+            <a:off x="1206500" y="4248503"/>
+            <a:ext cx="21971000" cy="8256014"/>
+          </a:xfrm>
           <a:prstGeom prst="rect">
             <a:avLst/>
           </a:prstGeom>
         </p:spPr>
         <p:txBody>
-          <a:bodyPr/>
+          <a:bodyPr lIns="50800" tIns="50800" rIns="50800" bIns="50800"/>
           <a:lstStyle/>
           <a:p>
-            <a:pPr/>
+            <a:pPr marL="609600" indent="-609600" defTabSz="2438337">
+              <a:lnSpc>
+                <a:spcPct val="90000"/>
+              </a:lnSpc>
+              <a:spcBef>
+                <a:spcPts val="4500"/>
+              </a:spcBef>
+              <a:buSzPct val="123000"/>
+              <a:buChar char="•"/>
+              <a:defRPr b="0" sz="4800"/>
+            </a:pPr>
             <a:r>
               <a:t>The heat equation looks like </a:t>
             </a:r>
@@ -3978,7 +4131,7 @@
                 <m:f>
                   <m:fPr>
                     <m:ctrlPr>
-                      <a:rPr xmlns:a="http://schemas.openxmlformats.org/drawingml/2006/main" sz="5850" i="1">
+                      <a:rPr xmlns:a="http://schemas.openxmlformats.org/drawingml/2006/main" sz="5800" i="1">
                         <a:solidFill>
                           <a:srgbClr val="000000"/>
                         </a:solidFill>
@@ -3989,10 +4142,7 @@
                   </m:fPr>
                   <m:num>
                     <m:r>
-                      <m:rPr>
-                        <m:sty m:val="p"/>
-                      </m:rPr>
-                      <a:rPr xmlns:a="http://schemas.openxmlformats.org/drawingml/2006/main" sz="5850" i="1">
+                      <a:rPr xmlns:a="http://schemas.openxmlformats.org/drawingml/2006/main" sz="5800" i="1">
                         <a:solidFill>
                           <a:srgbClr val="000000"/>
                         </a:solidFill>
@@ -4001,7 +4151,7 @@
                       <m:t>∂</m:t>
                     </m:r>
                     <m:r>
-                      <a:rPr xmlns:a="http://schemas.openxmlformats.org/drawingml/2006/main" sz="5850" i="1">
+                      <a:rPr xmlns:a="http://schemas.openxmlformats.org/drawingml/2006/main" sz="5800" i="1">
                         <a:solidFill>
                           <a:srgbClr val="000000"/>
                         </a:solidFill>
@@ -4012,10 +4162,7 @@
                   </m:num>
                   <m:den>
                     <m:r>
-                      <m:rPr>
-                        <m:sty m:val="p"/>
-                      </m:rPr>
-                      <a:rPr xmlns:a="http://schemas.openxmlformats.org/drawingml/2006/main" sz="5850" i="1">
+                      <a:rPr xmlns:a="http://schemas.openxmlformats.org/drawingml/2006/main" sz="5800" i="1">
                         <a:solidFill>
                           <a:srgbClr val="000000"/>
                         </a:solidFill>
@@ -4024,7 +4171,7 @@
                       <m:t>∂</m:t>
                     </m:r>
                     <m:r>
-                      <a:rPr xmlns:a="http://schemas.openxmlformats.org/drawingml/2006/main" sz="5850" i="1">
+                      <a:rPr xmlns:a="http://schemas.openxmlformats.org/drawingml/2006/main" sz="5800" i="1">
                         <a:solidFill>
                           <a:srgbClr val="000000"/>
                         </a:solidFill>
@@ -4035,7 +4182,7 @@
                   </m:den>
                 </m:f>
                 <m:r>
-                  <a:rPr xmlns:a="http://schemas.openxmlformats.org/drawingml/2006/main" sz="5850" i="1">
+                  <a:rPr xmlns:a="http://schemas.openxmlformats.org/drawingml/2006/main" sz="5800" i="1">
                     <a:solidFill>
                       <a:srgbClr val="000000"/>
                     </a:solidFill>
@@ -4044,7 +4191,7 @@
                   <m:t>=</m:t>
                 </m:r>
                 <m:r>
-                  <a:rPr xmlns:a="http://schemas.openxmlformats.org/drawingml/2006/main" sz="5850" i="1">
+                  <a:rPr xmlns:a="http://schemas.openxmlformats.org/drawingml/2006/main" sz="5800" i="1">
                     <a:solidFill>
                       <a:srgbClr val="000000"/>
                     </a:solidFill>
@@ -4055,7 +4202,7 @@
                 <m:f>
                   <m:fPr>
                     <m:ctrlPr>
-                      <a:rPr xmlns:a="http://schemas.openxmlformats.org/drawingml/2006/main" sz="5850" i="1">
+                      <a:rPr xmlns:a="http://schemas.openxmlformats.org/drawingml/2006/main" sz="5800" i="1">
                         <a:solidFill>
                           <a:srgbClr val="000000"/>
                         </a:solidFill>
@@ -4068,10 +4215,7 @@
                     <m:sSup>
                       <m:e>
                         <m:r>
-                          <m:rPr>
-                            <m:sty m:val="p"/>
-                          </m:rPr>
-                          <a:rPr xmlns:a="http://schemas.openxmlformats.org/drawingml/2006/main" sz="5850" i="1">
+                          <a:rPr xmlns:a="http://schemas.openxmlformats.org/drawingml/2006/main" sz="5800" i="1">
                             <a:solidFill>
                               <a:srgbClr val="000000"/>
                             </a:solidFill>
@@ -4082,7 +4226,7 @@
                       </m:e>
                       <m:sup>
                         <m:r>
-                          <a:rPr xmlns:a="http://schemas.openxmlformats.org/drawingml/2006/main" sz="5850" i="1">
+                          <a:rPr xmlns:a="http://schemas.openxmlformats.org/drawingml/2006/main" sz="5800" i="1">
                             <a:solidFill>
                               <a:srgbClr val="000000"/>
                             </a:solidFill>
@@ -4093,7 +4237,7 @@
                       </m:sup>
                     </m:sSup>
                     <m:r>
-                      <a:rPr xmlns:a="http://schemas.openxmlformats.org/drawingml/2006/main" sz="5850" i="1">
+                      <a:rPr xmlns:a="http://schemas.openxmlformats.org/drawingml/2006/main" sz="5800" i="1">
                         <a:solidFill>
                           <a:srgbClr val="000000"/>
                         </a:solidFill>
@@ -4104,10 +4248,7 @@
                   </m:num>
                   <m:den>
                     <m:r>
-                      <m:rPr>
-                        <m:sty m:val="p"/>
-                      </m:rPr>
-                      <a:rPr xmlns:a="http://schemas.openxmlformats.org/drawingml/2006/main" sz="5850" i="1">
+                      <a:rPr xmlns:a="http://schemas.openxmlformats.org/drawingml/2006/main" sz="5800" i="1">
                         <a:solidFill>
                           <a:srgbClr val="000000"/>
                         </a:solidFill>
@@ -4118,7 +4259,7 @@
                     <m:sSup>
                       <m:e>
                         <m:r>
-                          <a:rPr xmlns:a="http://schemas.openxmlformats.org/drawingml/2006/main" sz="5850" i="1">
+                          <a:rPr xmlns:a="http://schemas.openxmlformats.org/drawingml/2006/main" sz="5800" i="1">
                             <a:solidFill>
                               <a:srgbClr val="000000"/>
                             </a:solidFill>
@@ -4129,7 +4270,7 @@
                       </m:e>
                       <m:sup>
                         <m:r>
-                          <a:rPr xmlns:a="http://schemas.openxmlformats.org/drawingml/2006/main" sz="5850" i="1">
+                          <a:rPr xmlns:a="http://schemas.openxmlformats.org/drawingml/2006/main" sz="5800" i="1">
                             <a:solidFill>
                               <a:srgbClr val="000000"/>
                             </a:solidFill>
@@ -4145,19 +4286,49 @@
             </a14:m>
           </a:p>
           <a:p>
-            <a:pPr/>
+            <a:pPr marL="609600" indent="-609600" defTabSz="2438337">
+              <a:lnSpc>
+                <a:spcPct val="90000"/>
+              </a:lnSpc>
+              <a:spcBef>
+                <a:spcPts val="4500"/>
+              </a:spcBef>
+              <a:buSzPct val="123000"/>
+              <a:buChar char="•"/>
+              <a:defRPr b="0" sz="4800"/>
+            </a:pPr>
             <a:r>
               <a:t>Unlike ODE’s, to solve this type of differential equation numerically, both the temporal and spatial domains need to be discretized</a:t>
             </a:r>
           </a:p>
           <a:p>
-            <a:pPr/>
+            <a:pPr marL="609600" indent="-609600" defTabSz="2438337">
+              <a:lnSpc>
+                <a:spcPct val="90000"/>
+              </a:lnSpc>
+              <a:spcBef>
+                <a:spcPts val="4500"/>
+              </a:spcBef>
+              <a:buSzPct val="123000"/>
+              <a:buChar char="•"/>
+              <a:defRPr b="0" sz="4800"/>
+            </a:pPr>
             <a:r>
               <a:t>The first step is to divide the spacial and temporal domains into discrete step sizes</a:t>
             </a:r>
           </a:p>
           <a:p>
-            <a:pPr/>
+            <a:pPr marL="609600" indent="-609600" defTabSz="2438337">
+              <a:lnSpc>
+                <a:spcPct val="90000"/>
+              </a:lnSpc>
+              <a:spcBef>
+                <a:spcPts val="4500"/>
+              </a:spcBef>
+              <a:buSzPct val="123000"/>
+              <a:buChar char="•"/>
+              <a:defRPr b="0" sz="4800"/>
+            </a:pPr>
             <a:r>
               <a:t>Note that, the number of steps do not need to be the same between domains and the step sizes don’t have to be the same in each domain either</a:t>
             </a:r>
@@ -4199,13 +4370,21 @@
           </p:nvPr>
         </p:nvSpPr>
         <p:spPr>
+          <a:xfrm>
+            <a:off x="1206500" y="1079499"/>
+            <a:ext cx="21971000" cy="1433165"/>
+          </a:xfrm>
           <a:prstGeom prst="rect">
             <a:avLst/>
           </a:prstGeom>
         </p:spPr>
         <p:txBody>
           <a:bodyPr/>
-          <a:lstStyle/>
+          <a:lstStyle>
+            <a:lvl1pPr>
+              <a:defRPr spc="-200"/>
+            </a:lvl1pPr>
+          </a:lstStyle>
           <a:p>
             <a:pPr/>
             <a:r>
@@ -4223,27 +4402,66 @@
           </p:nvPr>
         </p:nvSpPr>
         <p:spPr>
+          <a:xfrm>
+            <a:off x="1206500" y="4248503"/>
+            <a:ext cx="21971000" cy="8256014"/>
+          </a:xfrm>
           <a:prstGeom prst="rect">
             <a:avLst/>
           </a:prstGeom>
         </p:spPr>
         <p:txBody>
-          <a:bodyPr/>
+          <a:bodyPr lIns="50800" tIns="50800" rIns="50800" bIns="50800"/>
           <a:lstStyle/>
           <a:p>
-            <a:pPr/>
+            <a:pPr marL="609600" indent="-609600" defTabSz="2438337">
+              <a:lnSpc>
+                <a:spcPct val="90000"/>
+              </a:lnSpc>
+              <a:spcBef>
+                <a:spcPts val="4500"/>
+              </a:spcBef>
+              <a:buSzPct val="123000"/>
+              <a:buChar char="•"/>
+              <a:defRPr b="0" sz="4800"/>
+            </a:pPr>
             <a:r>
               <a:t>Suppose there are N uniform steps in the temporal domain and M uniform steps in the spatial domain</a:t>
             </a:r>
           </a:p>
           <a:p>
-            <a:pPr/>
+            <a:pPr marL="609600" indent="-609600" defTabSz="2438337">
+              <a:lnSpc>
+                <a:spcPct val="90000"/>
+              </a:lnSpc>
+              <a:spcBef>
+                <a:spcPts val="4500"/>
+              </a:spcBef>
+              <a:buSzPct val="123000"/>
+              <a:buChar char="•"/>
+              <a:defRPr b="0" sz="4800"/>
+            </a:pPr>
             <a:r>
               <a:t>Then we can approximate derivatives as finite differences</a:t>
             </a:r>
           </a:p>
           <a:p>
-            <a:pPr/>
+            <a:pPr marL="504496" indent="-504496" defTabSz="2438337">
+              <a:lnSpc>
+                <a:spcPct val="90000"/>
+              </a:lnSpc>
+              <a:spcBef>
+                <a:spcPts val="4500"/>
+              </a:spcBef>
+              <a:buSzPct val="123000"/>
+              <a:buChar char="•"/>
+              <a:defRPr b="0" sz="5800">
+                <a:latin typeface="Cambria Math"/>
+                <a:ea typeface="Cambria Math"/>
+                <a:cs typeface="Cambria Math"/>
+                <a:sym typeface="Cambria Math"/>
+              </a:defRPr>
+            </a:pPr>
             <a14:m>
               <m:oMath>
                 <m:f>
@@ -4260,9 +4478,6 @@
                   </m:fPr>
                   <m:num>
                     <m:r>
-                      <m:rPr>
-                        <m:sty m:val="p"/>
-                      </m:rPr>
                       <a:rPr xmlns:a="http://schemas.openxmlformats.org/drawingml/2006/main" sz="5800" i="1">
                         <a:solidFill>
                           <a:srgbClr val="000000"/>
@@ -4283,9 +4498,6 @@
                   </m:num>
                   <m:den>
                     <m:r>
-                      <m:rPr>
-                        <m:sty m:val="p"/>
-                      </m:rPr>
                       <a:rPr xmlns:a="http://schemas.openxmlformats.org/drawingml/2006/main" sz="5800" i="1">
                         <a:solidFill>
                           <a:srgbClr val="000000"/>
@@ -4451,10 +4663,38 @@
                 </m:f>
               </m:oMath>
             </a14:m>
-            <a:br/>
-          </a:p>
-          <a:p>
-            <a:pPr/>
+            <a:br>
+              <a:rPr sz="4800">
+                <a:latin typeface="+mn-lt"/>
+                <a:ea typeface="+mn-ea"/>
+                <a:cs typeface="+mn-cs"/>
+                <a:sym typeface="Helvetica Neue"/>
+              </a:rPr>
+            </a:br>
+            <a:endParaRPr sz="4800">
+              <a:latin typeface="+mn-lt"/>
+              <a:ea typeface="+mn-ea"/>
+              <a:cs typeface="+mn-cs"/>
+              <a:sym typeface="Helvetica Neue"/>
+            </a:endParaRPr>
+          </a:p>
+          <a:p>
+            <a:pPr marL="504496" indent="-504496" defTabSz="2438337">
+              <a:lnSpc>
+                <a:spcPct val="90000"/>
+              </a:lnSpc>
+              <a:spcBef>
+                <a:spcPts val="4500"/>
+              </a:spcBef>
+              <a:buSzPct val="123000"/>
+              <a:buChar char="•"/>
+              <a:defRPr b="0" sz="5800">
+                <a:latin typeface="Cambria Math"/>
+                <a:ea typeface="Cambria Math"/>
+                <a:cs typeface="Cambria Math"/>
+                <a:sym typeface="Cambria Math"/>
+              </a:defRPr>
+            </a:pPr>
             <a14:m>
               <m:oMathPara>
                 <m:oMathParaPr>
@@ -4477,9 +4717,6 @@
                       <m:sSup>
                         <m:e>
                           <m:r>
-                            <m:rPr>
-                              <m:sty m:val="p"/>
-                            </m:rPr>
                             <a:rPr xmlns:a="http://schemas.openxmlformats.org/drawingml/2006/main" sz="5800" i="1">
                               <a:solidFill>
                                 <a:srgbClr val="000000"/>
@@ -4513,9 +4750,6 @@
                     </m:num>
                     <m:den>
                       <m:r>
-                        <m:rPr>
-                          <m:sty m:val="p"/>
-                        </m:rPr>
                         <a:rPr xmlns:a="http://schemas.openxmlformats.org/drawingml/2006/main" sz="5800" i="1">
                           <a:solidFill>
                             <a:srgbClr val="000000"/>
@@ -4801,6 +5035,7 @@
                 </m:oMath>
               </m:oMathPara>
             </a14:m>
+            <a:endParaRPr sz="4800"/>
           </a:p>
         </p:txBody>
       </p:sp>
@@ -4839,13 +5074,21 @@
           </p:nvPr>
         </p:nvSpPr>
         <p:spPr>
+          <a:xfrm>
+            <a:off x="1206500" y="1079499"/>
+            <a:ext cx="21971000" cy="1433165"/>
+          </a:xfrm>
           <a:prstGeom prst="rect">
             <a:avLst/>
           </a:prstGeom>
         </p:spPr>
         <p:txBody>
           <a:bodyPr/>
-          <a:lstStyle/>
+          <a:lstStyle>
+            <a:lvl1pPr>
+              <a:defRPr spc="-200"/>
+            </a:lvl1pPr>
+          </a:lstStyle>
           <a:p>
             <a:pPr/>
             <a:r>
@@ -4863,21 +5106,50 @@
           </p:nvPr>
         </p:nvSpPr>
         <p:spPr>
+          <a:xfrm>
+            <a:off x="1206500" y="4248503"/>
+            <a:ext cx="21971000" cy="8256014"/>
+          </a:xfrm>
           <a:prstGeom prst="rect">
             <a:avLst/>
           </a:prstGeom>
         </p:spPr>
         <p:txBody>
-          <a:bodyPr/>
+          <a:bodyPr lIns="50800" tIns="50800" rIns="50800" bIns="50800"/>
           <a:lstStyle/>
           <a:p>
-            <a:pPr/>
-            <a:r>
-              <a:t>It then follows that the discritized heat equation is:</a:t>
-            </a:r>
-          </a:p>
-          <a:p>
-            <a:pPr/>
+            <a:pPr marL="609600" indent="-609600" defTabSz="2438337">
+              <a:lnSpc>
+                <a:spcPct val="90000"/>
+              </a:lnSpc>
+              <a:spcBef>
+                <a:spcPts val="4500"/>
+              </a:spcBef>
+              <a:buSzPct val="123000"/>
+              <a:buChar char="•"/>
+              <a:defRPr b="0" sz="4800"/>
+            </a:pPr>
+            <a:r>
+              <a:t>It then follows that the discretized heat equation is:</a:t>
+            </a:r>
+          </a:p>
+          <a:p>
+            <a:pPr marL="504496" indent="-504496" defTabSz="2438337">
+              <a:lnSpc>
+                <a:spcPct val="90000"/>
+              </a:lnSpc>
+              <a:spcBef>
+                <a:spcPts val="4500"/>
+              </a:spcBef>
+              <a:buSzPct val="123000"/>
+              <a:buChar char="•"/>
+              <a:defRPr b="0" sz="5800">
+                <a:latin typeface="Cambria Math"/>
+                <a:ea typeface="Cambria Math"/>
+                <a:cs typeface="Cambria Math"/>
+                <a:sym typeface="Cambria Math"/>
+              </a:defRPr>
+            </a:pPr>
             <a14:m>
               <m:oMathPara>
                 <m:oMathParaPr>
@@ -5279,15 +5551,41 @@
                 </m:oMath>
               </m:oMathPara>
             </a14:m>
-          </a:p>
-          <a:p>
-            <a:pPr/>
+            <a:endParaRPr sz="4800">
+              <a:latin typeface="+mn-lt"/>
+              <a:ea typeface="+mn-ea"/>
+              <a:cs typeface="+mn-cs"/>
+              <a:sym typeface="Helvetica Neue"/>
+            </a:endParaRPr>
+          </a:p>
+          <a:p>
+            <a:pPr marL="609600" indent="-609600" defTabSz="2438337">
+              <a:lnSpc>
+                <a:spcPct val="90000"/>
+              </a:lnSpc>
+              <a:spcBef>
+                <a:spcPts val="4500"/>
+              </a:spcBef>
+              <a:buSzPct val="123000"/>
+              <a:buChar char="•"/>
+              <a:defRPr b="0" sz="4800"/>
+            </a:pPr>
             <a:r>
               <a:t>This equation can then be solved iterably</a:t>
             </a:r>
           </a:p>
           <a:p>
-            <a:pPr/>
+            <a:pPr marL="609600" indent="-609600" defTabSz="2438337">
+              <a:lnSpc>
+                <a:spcPct val="90000"/>
+              </a:lnSpc>
+              <a:spcBef>
+                <a:spcPts val="4500"/>
+              </a:spcBef>
+              <a:buSzPct val="123000"/>
+              <a:buChar char="•"/>
+              <a:defRPr b="0" sz="4800"/>
+            </a:pPr>
             <a:r>
               <a:t>As you might have noticed, before solving this, you need an initial condition and boundary condition</a:t>
             </a:r>
@@ -5312,8 +5610,8 @@
         </p:blipFill>
         <p:spPr>
           <a:xfrm>
-            <a:off x="16998132" y="1026493"/>
-            <a:ext cx="6386069" cy="3592164"/>
+            <a:off x="16998131" y="1026492"/>
+            <a:ext cx="6386070" cy="3592166"/>
           </a:xfrm>
           <a:prstGeom prst="rect">
             <a:avLst/>
@@ -5343,10 +5641,10 @@
         <a:srgbClr val="FFFFFF"/>
       </a:lt1>
       <a:dk2>
-        <a:srgbClr val="5E5E5E"/>
+        <a:srgbClr val="A7A7A7"/>
       </a:dk2>
       <a:lt2>
-        <a:srgbClr val="D5D5D5"/>
+        <a:srgbClr val="535353"/>
       </a:lt2>
       <a:accent1>
         <a:srgbClr val="00A2FF"/>
@@ -5375,9 +5673,9 @@
     </a:clrScheme>
     <a:fontScheme name="21_BasicWhite">
       <a:majorFont>
-        <a:latin typeface="Helvetica Neue"/>
-        <a:ea typeface="Helvetica Neue"/>
-        <a:cs typeface="Helvetica Neue"/>
+        <a:latin typeface="Helvetica"/>
+        <a:ea typeface="Helvetica"/>
+        <a:cs typeface="Helvetica"/>
       </a:majorFont>
       <a:minorFont>
         <a:latin typeface="Helvetica Neue"/>
@@ -5523,11 +5821,14 @@
     <a:spDef>
       <a:spPr>
         <a:solidFill>
-          <a:srgbClr val="000000"/>
+          <a:srgbClr val="FFFFFF"/>
         </a:solidFill>
-        <a:ln w="12700" cap="flat">
-          <a:noFill/>
-          <a:miter lim="400000"/>
+        <a:ln w="25400" cap="flat">
+          <a:solidFill>
+            <a:schemeClr val="accent1"/>
+          </a:solidFill>
+          <a:prstDash val="solid"/>
+          <a:round/>
         </a:ln>
         <a:effectLst/>
         <a:sp3d/>
@@ -5536,7 +5837,7 @@
         <a:spAutoFit/>
       </a:bodyPr>
       <a:lstStyle>
-        <a:defPPr marL="0" marR="0" indent="0" algn="ctr" defTabSz="825500" rtl="0" fontAlgn="auto" latinLnBrk="0" hangingPunct="0">
+        <a:defPPr marL="0" marR="0" indent="0" algn="ctr" defTabSz="2438337" rtl="0" fontAlgn="auto" latinLnBrk="0" hangingPunct="0">
           <a:lnSpc>
             <a:spcPct val="100000"/>
           </a:lnSpc>
@@ -5551,19 +5852,19 @@
           <a:buFontTx/>
           <a:buNone/>
           <a:tabLst/>
-          <a:defRPr b="0" baseline="0" cap="none" i="0" spc="0" strike="noStrike" sz="3200" u="none" kumimoji="0" normalizeH="0">
+          <a:defRPr b="0" baseline="0" cap="none" i="0" spc="0" strike="noStrike" sz="2400" u="none" kumimoji="0" normalizeH="0">
             <a:ln>
               <a:noFill/>
             </a:ln>
             <a:solidFill>
-              <a:srgbClr val="FFFFFF"/>
+              <a:srgbClr val="5E5E5E"/>
             </a:solidFill>
             <a:effectLst/>
             <a:uFillTx/>
-            <a:latin typeface="Helvetica Neue Medium"/>
-            <a:ea typeface="Helvetica Neue Medium"/>
-            <a:cs typeface="Helvetica Neue Medium"/>
-            <a:sym typeface="Helvetica Neue Medium"/>
+            <a:latin typeface="+mn-lt"/>
+            <a:ea typeface="+mn-ea"/>
+            <a:cs typeface="+mn-cs"/>
+            <a:sym typeface="Helvetica Neue"/>
           </a:defRPr>
         </a:defPPr>
         <a:lvl1pPr marL="0" marR="0" indent="0" algn="l" defTabSz="914400" rtl="0" fontAlgn="auto" latinLnBrk="1" hangingPunct="0">
@@ -5813,10 +6114,10 @@
         <a:noFill/>
         <a:ln w="25400" cap="flat">
           <a:solidFill>
-            <a:srgbClr val="000000"/>
+            <a:schemeClr val="accent1"/>
           </a:solidFill>
           <a:prstDash val="solid"/>
-          <a:miter lim="400000"/>
+          <a:round/>
         </a:ln>
         <a:effectLst/>
         <a:sp3d/>
@@ -6107,7 +6408,7 @@
         <a:spAutoFit/>
       </a:bodyPr>
       <a:lstStyle>
-        <a:defPPr marL="0" marR="0" indent="0" algn="ctr" defTabSz="2438338" rtl="0" fontAlgn="auto" latinLnBrk="0" hangingPunct="0">
+        <a:defPPr marL="0" marR="0" indent="0" algn="ctr" defTabSz="2438337" rtl="0" fontAlgn="auto" latinLnBrk="0" hangingPunct="0">
           <a:lnSpc>
             <a:spcPct val="100000"/>
           </a:lnSpc>
@@ -6394,10 +6695,10 @@
         <a:srgbClr val="FFFFFF"/>
       </a:lt1>
       <a:dk2>
-        <a:srgbClr val="5E5E5E"/>
+        <a:srgbClr val="A7A7A7"/>
       </a:dk2>
       <a:lt2>
-        <a:srgbClr val="D5D5D5"/>
+        <a:srgbClr val="535353"/>
       </a:lt2>
       <a:accent1>
         <a:srgbClr val="00A2FF"/>
@@ -6426,9 +6727,9 @@
     </a:clrScheme>
     <a:fontScheme name="21_BasicWhite">
       <a:majorFont>
-        <a:latin typeface="Helvetica Neue"/>
-        <a:ea typeface="Helvetica Neue"/>
-        <a:cs typeface="Helvetica Neue"/>
+        <a:latin typeface="Helvetica"/>
+        <a:ea typeface="Helvetica"/>
+        <a:cs typeface="Helvetica"/>
       </a:majorFont>
       <a:minorFont>
         <a:latin typeface="Helvetica Neue"/>
@@ -6574,11 +6875,14 @@
     <a:spDef>
       <a:spPr>
         <a:solidFill>
-          <a:srgbClr val="000000"/>
+          <a:srgbClr val="FFFFFF"/>
         </a:solidFill>
-        <a:ln w="12700" cap="flat">
-          <a:noFill/>
-          <a:miter lim="400000"/>
+        <a:ln w="25400" cap="flat">
+          <a:solidFill>
+            <a:schemeClr val="accent1"/>
+          </a:solidFill>
+          <a:prstDash val="solid"/>
+          <a:round/>
         </a:ln>
         <a:effectLst/>
         <a:sp3d/>
@@ -6587,7 +6891,7 @@
         <a:spAutoFit/>
       </a:bodyPr>
       <a:lstStyle>
-        <a:defPPr marL="0" marR="0" indent="0" algn="ctr" defTabSz="825500" rtl="0" fontAlgn="auto" latinLnBrk="0" hangingPunct="0">
+        <a:defPPr marL="0" marR="0" indent="0" algn="ctr" defTabSz="2438337" rtl="0" fontAlgn="auto" latinLnBrk="0" hangingPunct="0">
           <a:lnSpc>
             <a:spcPct val="100000"/>
           </a:lnSpc>
@@ -6602,19 +6906,19 @@
           <a:buFontTx/>
           <a:buNone/>
           <a:tabLst/>
-          <a:defRPr b="0" baseline="0" cap="none" i="0" spc="0" strike="noStrike" sz="3200" u="none" kumimoji="0" normalizeH="0">
+          <a:defRPr b="0" baseline="0" cap="none" i="0" spc="0" strike="noStrike" sz="2400" u="none" kumimoji="0" normalizeH="0">
             <a:ln>
               <a:noFill/>
             </a:ln>
             <a:solidFill>
-              <a:srgbClr val="FFFFFF"/>
+              <a:srgbClr val="5E5E5E"/>
             </a:solidFill>
             <a:effectLst/>
             <a:uFillTx/>
-            <a:latin typeface="Helvetica Neue Medium"/>
-            <a:ea typeface="Helvetica Neue Medium"/>
-            <a:cs typeface="Helvetica Neue Medium"/>
-            <a:sym typeface="Helvetica Neue Medium"/>
+            <a:latin typeface="+mn-lt"/>
+            <a:ea typeface="+mn-ea"/>
+            <a:cs typeface="+mn-cs"/>
+            <a:sym typeface="Helvetica Neue"/>
           </a:defRPr>
         </a:defPPr>
         <a:lvl1pPr marL="0" marR="0" indent="0" algn="l" defTabSz="914400" rtl="0" fontAlgn="auto" latinLnBrk="1" hangingPunct="0">
@@ -6864,10 +7168,10 @@
         <a:noFill/>
         <a:ln w="25400" cap="flat">
           <a:solidFill>
-            <a:srgbClr val="000000"/>
+            <a:schemeClr val="accent1"/>
           </a:solidFill>
           <a:prstDash val="solid"/>
-          <a:miter lim="400000"/>
+          <a:round/>
         </a:ln>
         <a:effectLst/>
         <a:sp3d/>
@@ -7158,7 +7462,7 @@
         <a:spAutoFit/>
       </a:bodyPr>
       <a:lstStyle>
-        <a:defPPr marL="0" marR="0" indent="0" algn="ctr" defTabSz="2438338" rtl="0" fontAlgn="auto" latinLnBrk="0" hangingPunct="0">
+        <a:defPPr marL="0" marR="0" indent="0" algn="ctr" defTabSz="2438337" rtl="0" fontAlgn="auto" latinLnBrk="0" hangingPunct="0">
           <a:lnSpc>
             <a:spcPct val="100000"/>
           </a:lnSpc>

</xml_diff>